<commit_message>
updated DIY 4 sinusoids generation
updated commments
and DIY == 4 sinusoids according to Maths 2 lecture notes
</commit_message>
<xml_diff>
--- a/FourierIntro_v1_CES.pptx
+++ b/FourierIntro_v1_CES.pptx
@@ -11,6 +11,8 @@
     <p:sldId id="262" r:id="rId5"/>
     <p:sldId id="260" r:id="rId6"/>
     <p:sldId id="263" r:id="rId7"/>
+    <p:sldId id="264" r:id="rId8"/>
+    <p:sldId id="265" r:id="rId9"/>
   </p:sldIdLst>
   <p:sldSz cx="12192000" cy="6858000"/>
   <p:notesSz cx="6858000" cy="9144000"/>
@@ -248,7 +250,7 @@
           <a:p>
             <a:fld id="{2D40B193-DB81-4E09-BEF4-825FB5F11C31}" type="datetimeFigureOut">
               <a:rPr lang="en-GB" smtClean="0"/>
-              <a:t>23/10/2018</a:t>
+              <a:t>25/10/2018</a:t>
             </a:fld>
             <a:endParaRPr lang="en-GB"/>
           </a:p>
@@ -418,7 +420,7 @@
           <a:p>
             <a:fld id="{2D40B193-DB81-4E09-BEF4-825FB5F11C31}" type="datetimeFigureOut">
               <a:rPr lang="en-GB" smtClean="0"/>
-              <a:t>23/10/2018</a:t>
+              <a:t>25/10/2018</a:t>
             </a:fld>
             <a:endParaRPr lang="en-GB"/>
           </a:p>
@@ -598,7 +600,7 @@
           <a:p>
             <a:fld id="{2D40B193-DB81-4E09-BEF4-825FB5F11C31}" type="datetimeFigureOut">
               <a:rPr lang="en-GB" smtClean="0"/>
-              <a:t>23/10/2018</a:t>
+              <a:t>25/10/2018</a:t>
             </a:fld>
             <a:endParaRPr lang="en-GB"/>
           </a:p>
@@ -768,7 +770,7 @@
           <a:p>
             <a:fld id="{2D40B193-DB81-4E09-BEF4-825FB5F11C31}" type="datetimeFigureOut">
               <a:rPr lang="en-GB" smtClean="0"/>
-              <a:t>23/10/2018</a:t>
+              <a:t>25/10/2018</a:t>
             </a:fld>
             <a:endParaRPr lang="en-GB"/>
           </a:p>
@@ -1014,7 +1016,7 @@
           <a:p>
             <a:fld id="{2D40B193-DB81-4E09-BEF4-825FB5F11C31}" type="datetimeFigureOut">
               <a:rPr lang="en-GB" smtClean="0"/>
-              <a:t>23/10/2018</a:t>
+              <a:t>25/10/2018</a:t>
             </a:fld>
             <a:endParaRPr lang="en-GB"/>
           </a:p>
@@ -1246,7 +1248,7 @@
           <a:p>
             <a:fld id="{2D40B193-DB81-4E09-BEF4-825FB5F11C31}" type="datetimeFigureOut">
               <a:rPr lang="en-GB" smtClean="0"/>
-              <a:t>23/10/2018</a:t>
+              <a:t>25/10/2018</a:t>
             </a:fld>
             <a:endParaRPr lang="en-GB"/>
           </a:p>
@@ -1613,7 +1615,7 @@
           <a:p>
             <a:fld id="{2D40B193-DB81-4E09-BEF4-825FB5F11C31}" type="datetimeFigureOut">
               <a:rPr lang="en-GB" smtClean="0"/>
-              <a:t>23/10/2018</a:t>
+              <a:t>25/10/2018</a:t>
             </a:fld>
             <a:endParaRPr lang="en-GB"/>
           </a:p>
@@ -1731,7 +1733,7 @@
           <a:p>
             <a:fld id="{2D40B193-DB81-4E09-BEF4-825FB5F11C31}" type="datetimeFigureOut">
               <a:rPr lang="en-GB" smtClean="0"/>
-              <a:t>23/10/2018</a:t>
+              <a:t>25/10/2018</a:t>
             </a:fld>
             <a:endParaRPr lang="en-GB"/>
           </a:p>
@@ -1826,7 +1828,7 @@
           <a:p>
             <a:fld id="{2D40B193-DB81-4E09-BEF4-825FB5F11C31}" type="datetimeFigureOut">
               <a:rPr lang="en-GB" smtClean="0"/>
-              <a:t>23/10/2018</a:t>
+              <a:t>25/10/2018</a:t>
             </a:fld>
             <a:endParaRPr lang="en-GB"/>
           </a:p>
@@ -2103,7 +2105,7 @@
           <a:p>
             <a:fld id="{2D40B193-DB81-4E09-BEF4-825FB5F11C31}" type="datetimeFigureOut">
               <a:rPr lang="en-GB" smtClean="0"/>
-              <a:t>23/10/2018</a:t>
+              <a:t>25/10/2018</a:t>
             </a:fld>
             <a:endParaRPr lang="en-GB"/>
           </a:p>
@@ -2356,7 +2358,7 @@
           <a:p>
             <a:fld id="{2D40B193-DB81-4E09-BEF4-825FB5F11C31}" type="datetimeFigureOut">
               <a:rPr lang="en-GB" smtClean="0"/>
-              <a:t>23/10/2018</a:t>
+              <a:t>25/10/2018</a:t>
             </a:fld>
             <a:endParaRPr lang="en-GB"/>
           </a:p>
@@ -2569,7 +2571,7 @@
           <a:p>
             <a:fld id="{2D40B193-DB81-4E09-BEF4-825FB5F11C31}" type="datetimeFigureOut">
               <a:rPr lang="en-GB" smtClean="0"/>
-              <a:t>23/10/2018</a:t>
+              <a:t>25/10/2018</a:t>
             </a:fld>
             <a:endParaRPr lang="en-GB"/>
           </a:p>
@@ -3269,11 +3271,7 @@
             </a:pPr>
             <a:r>
               <a:rPr lang="en-US" dirty="0" smtClean="0"/>
-              <a:t>6) How to calculate the Fourier </a:t>
-            </a:r>
-            <a:r>
-              <a:rPr lang="en-US" dirty="0" smtClean="0"/>
-              <a:t>coefficients</a:t>
+              <a:t>6) How to calculate the Fourier coefficients</a:t>
             </a:r>
           </a:p>
           <a:p>
@@ -3288,7 +3286,6 @@
               <a:rPr lang="en-US" dirty="0" smtClean="0"/>
               <a:t>- Table of common FS and FT</a:t>
             </a:r>
-            <a:endParaRPr lang="en-US" dirty="0" smtClean="0"/>
           </a:p>
           <a:p>
             <a:pPr lvl="1"/>
@@ -3596,11 +3593,7 @@
           <a:p>
             <a:r>
               <a:rPr lang="en-US" dirty="0" smtClean="0"/>
-              <a:t>Some great </a:t>
-            </a:r>
-            <a:r>
-              <a:rPr lang="en-US" dirty="0" smtClean="0"/>
-              <a:t>references</a:t>
+              <a:t>Some great references</a:t>
             </a:r>
             <a:br>
               <a:rPr lang="en-US" dirty="0" smtClean="0"/>
@@ -3981,6 +3974,520 @@
     <p:extLst>
       <p:ext uri="{BB962C8B-B14F-4D97-AF65-F5344CB8AC3E}">
         <p14:creationId xmlns:p14="http://schemas.microsoft.com/office/powerpoint/2010/main" val="444969330"/>
+      </p:ext>
+    </p:extLst>
+  </p:cSld>
+  <p:clrMapOvr>
+    <a:masterClrMapping/>
+  </p:clrMapOvr>
+</p:sld>
+</file>
+
+<file path=ppt/slides/slide7.xml><?xml version="1.0" encoding="utf-8"?>
+<p:sld xmlns:a="http://schemas.openxmlformats.org/drawingml/2006/main" xmlns:r="http://schemas.openxmlformats.org/officeDocument/2006/relationships" xmlns:p="http://schemas.openxmlformats.org/presentationml/2006/main">
+  <p:cSld>
+    <p:spTree>
+      <p:nvGrpSpPr>
+        <p:cNvPr id="1" name=""/>
+        <p:cNvGrpSpPr/>
+        <p:nvPr/>
+      </p:nvGrpSpPr>
+      <p:grpSpPr>
+        <a:xfrm>
+          <a:off x="0" y="0"/>
+          <a:ext cx="0" cy="0"/>
+          <a:chOff x="0" y="0"/>
+          <a:chExt cx="0" cy="0"/>
+        </a:xfrm>
+      </p:grpSpPr>
+      <p:sp>
+        <p:nvSpPr>
+          <p:cNvPr id="2" name="Title 1"/>
+          <p:cNvSpPr>
+            <a:spLocks noGrp="1"/>
+          </p:cNvSpPr>
+          <p:nvPr>
+            <p:ph type="title"/>
+          </p:nvPr>
+        </p:nvSpPr>
+        <p:spPr>
+          <a:xfrm>
+            <a:off x="173422" y="0"/>
+            <a:ext cx="10515600" cy="1325563"/>
+          </a:xfrm>
+        </p:spPr>
+        <p:txBody>
+          <a:bodyPr/>
+          <a:lstStyle/>
+          <a:p>
+            <a:r>
+              <a:rPr lang="en-US" dirty="0" smtClean="0"/>
+              <a:t>My </a:t>
+            </a:r>
+            <a:r>
+              <a:rPr lang="en-US" dirty="0" err="1" smtClean="0"/>
+              <a:t>Matlab</a:t>
+            </a:r>
+            <a:r>
+              <a:rPr lang="en-US" dirty="0" smtClean="0"/>
+              <a:t> Code - DIY</a:t>
+            </a:r>
+            <a:endParaRPr lang="en-GB" dirty="0"/>
+          </a:p>
+        </p:txBody>
+      </p:sp>
+      <p:pic>
+        <p:nvPicPr>
+          <p:cNvPr id="4" name="Content Placeholder 3"/>
+          <p:cNvPicPr>
+            <a:picLocks noGrp="1" noChangeAspect="1"/>
+          </p:cNvPicPr>
+          <p:nvPr>
+            <p:ph idx="1"/>
+          </p:nvPr>
+        </p:nvPicPr>
+        <p:blipFill>
+          <a:blip r:embed="rId2"/>
+          <a:stretch>
+            <a:fillRect/>
+          </a:stretch>
+        </p:blipFill>
+        <p:spPr>
+          <a:xfrm>
+            <a:off x="0" y="1301820"/>
+            <a:ext cx="6109374" cy="4351338"/>
+          </a:xfrm>
+          <a:prstGeom prst="rect">
+            <a:avLst/>
+          </a:prstGeom>
+        </p:spPr>
+      </p:pic>
+      <p:sp>
+        <p:nvSpPr>
+          <p:cNvPr id="6" name="TextBox 5"/>
+          <p:cNvSpPr txBox="1"/>
+          <p:nvPr/>
+        </p:nvSpPr>
+        <p:spPr>
+          <a:xfrm>
+            <a:off x="6366404" y="3225948"/>
+            <a:ext cx="4977709" cy="369332"/>
+          </a:xfrm>
+          <a:prstGeom prst="rect">
+            <a:avLst/>
+          </a:prstGeom>
+          <a:noFill/>
+        </p:spPr>
+        <p:txBody>
+          <a:bodyPr wrap="none" rtlCol="0">
+            <a:spAutoFit/>
+          </a:bodyPr>
+          <a:lstStyle/>
+          <a:p>
+            <a:r>
+              <a:rPr lang="en-US" dirty="0" smtClean="0"/>
+              <a:t>Using fundamental frequency F0  = 1/T0  = 1000 Hz</a:t>
+            </a:r>
+            <a:endParaRPr lang="en-GB" dirty="0"/>
+          </a:p>
+        </p:txBody>
+      </p:sp>
+      <p:pic>
+        <p:nvPicPr>
+          <p:cNvPr id="8" name="Picture 7"/>
+          <p:cNvPicPr>
+            <a:picLocks noChangeAspect="1"/>
+          </p:cNvPicPr>
+          <p:nvPr/>
+        </p:nvPicPr>
+        <p:blipFill>
+          <a:blip r:embed="rId3"/>
+          <a:stretch>
+            <a:fillRect/>
+          </a:stretch>
+        </p:blipFill>
+        <p:spPr>
+          <a:xfrm>
+            <a:off x="7730836" y="118011"/>
+            <a:ext cx="3954227" cy="3068953"/>
+          </a:xfrm>
+          <a:prstGeom prst="rect">
+            <a:avLst/>
+          </a:prstGeom>
+        </p:spPr>
+      </p:pic>
+      <p:pic>
+        <p:nvPicPr>
+          <p:cNvPr id="9" name="Picture 8"/>
+          <p:cNvPicPr>
+            <a:picLocks noChangeAspect="1"/>
+          </p:cNvPicPr>
+          <p:nvPr/>
+        </p:nvPicPr>
+        <p:blipFill>
+          <a:blip r:embed="rId4"/>
+          <a:stretch>
+            <a:fillRect/>
+          </a:stretch>
+        </p:blipFill>
+        <p:spPr>
+          <a:xfrm>
+            <a:off x="7730836" y="3595280"/>
+            <a:ext cx="3954227" cy="3214255"/>
+          </a:xfrm>
+          <a:prstGeom prst="rect">
+            <a:avLst/>
+          </a:prstGeom>
+        </p:spPr>
+      </p:pic>
+      <p:sp>
+        <p:nvSpPr>
+          <p:cNvPr id="10" name="TextBox 9"/>
+          <p:cNvSpPr txBox="1"/>
+          <p:nvPr/>
+        </p:nvSpPr>
+        <p:spPr>
+          <a:xfrm>
+            <a:off x="484909" y="6096000"/>
+            <a:ext cx="1002197" cy="369332"/>
+          </a:xfrm>
+          <a:prstGeom prst="rect">
+            <a:avLst/>
+          </a:prstGeom>
+          <a:noFill/>
+        </p:spPr>
+        <p:txBody>
+          <a:bodyPr wrap="none" rtlCol="0">
+            <a:spAutoFit/>
+          </a:bodyPr>
+          <a:lstStyle/>
+          <a:p>
+            <a:r>
+              <a:rPr lang="en-US" dirty="0" err="1" smtClean="0"/>
+              <a:t>Github</a:t>
+            </a:r>
+            <a:r>
+              <a:rPr lang="en-US" dirty="0" smtClean="0"/>
+              <a:t> - </a:t>
+            </a:r>
+            <a:endParaRPr lang="en-GB" dirty="0"/>
+          </a:p>
+        </p:txBody>
+      </p:sp>
+    </p:spTree>
+    <p:extLst>
+      <p:ext uri="{BB962C8B-B14F-4D97-AF65-F5344CB8AC3E}">
+        <p14:creationId xmlns:p14="http://schemas.microsoft.com/office/powerpoint/2010/main" val="2845404217"/>
+      </p:ext>
+    </p:extLst>
+  </p:cSld>
+  <p:clrMapOvr>
+    <a:masterClrMapping/>
+  </p:clrMapOvr>
+</p:sld>
+</file>
+
+<file path=ppt/slides/slide8.xml><?xml version="1.0" encoding="utf-8"?>
+<p:sld xmlns:a="http://schemas.openxmlformats.org/drawingml/2006/main" xmlns:r="http://schemas.openxmlformats.org/officeDocument/2006/relationships" xmlns:p="http://schemas.openxmlformats.org/presentationml/2006/main">
+  <p:cSld>
+    <p:spTree>
+      <p:nvGrpSpPr>
+        <p:cNvPr id="1" name=""/>
+        <p:cNvGrpSpPr/>
+        <p:nvPr/>
+      </p:nvGrpSpPr>
+      <p:grpSpPr>
+        <a:xfrm>
+          <a:off x="0" y="0"/>
+          <a:ext cx="0" cy="0"/>
+          <a:chOff x="0" y="0"/>
+          <a:chExt cx="0" cy="0"/>
+        </a:xfrm>
+      </p:grpSpPr>
+      <p:sp>
+        <p:nvSpPr>
+          <p:cNvPr id="3" name="Content Placeholder 2"/>
+          <p:cNvSpPr>
+            <a:spLocks noGrp="1"/>
+          </p:cNvSpPr>
+          <p:nvPr>
+            <p:ph idx="1"/>
+          </p:nvPr>
+        </p:nvSpPr>
+        <p:spPr>
+          <a:xfrm>
+            <a:off x="339436" y="287770"/>
+            <a:ext cx="3359727" cy="488084"/>
+          </a:xfrm>
+        </p:spPr>
+        <p:txBody>
+          <a:bodyPr>
+            <a:normAutofit fontScale="62500" lnSpcReduction="20000"/>
+          </a:bodyPr>
+          <a:lstStyle/>
+          <a:p>
+            <a:r>
+              <a:rPr lang="en-US" dirty="0" smtClean="0"/>
+              <a:t>Complex exponential representation</a:t>
+            </a:r>
+            <a:endParaRPr lang="en-GB" dirty="0"/>
+          </a:p>
+        </p:txBody>
+      </p:sp>
+      <p:sp>
+        <p:nvSpPr>
+          <p:cNvPr id="7" name="Content Placeholder 2"/>
+          <p:cNvSpPr txBox="1">
+            <a:spLocks/>
+          </p:cNvSpPr>
+          <p:nvPr/>
+        </p:nvSpPr>
+        <p:spPr>
+          <a:xfrm>
+            <a:off x="7114309" y="384752"/>
+            <a:ext cx="3359727" cy="488084"/>
+          </a:xfrm>
+          <a:prstGeom prst="rect">
+            <a:avLst/>
+          </a:prstGeom>
+        </p:spPr>
+        <p:txBody>
+          <a:bodyPr vert="horz" lIns="91440" tIns="45720" rIns="91440" bIns="45720" rtlCol="0">
+            <a:normAutofit fontScale="62500" lnSpcReduction="20000"/>
+          </a:bodyPr>
+          <a:lstStyle>
+            <a:lvl1pPr marL="228600" indent="-228600" algn="l" defTabSz="914400" rtl="0" eaLnBrk="1" latinLnBrk="0" hangingPunct="1">
+              <a:lnSpc>
+                <a:spcPct val="90000"/>
+              </a:lnSpc>
+              <a:spcBef>
+                <a:spcPts val="1000"/>
+              </a:spcBef>
+              <a:buFont typeface="Arial" panose="020B0604020202020204" pitchFamily="34" charset="0"/>
+              <a:buChar char="•"/>
+              <a:defRPr sz="2800" kern="1200">
+                <a:solidFill>
+                  <a:schemeClr val="tx1"/>
+                </a:solidFill>
+                <a:latin typeface="+mn-lt"/>
+                <a:ea typeface="+mn-ea"/>
+                <a:cs typeface="+mn-cs"/>
+              </a:defRPr>
+            </a:lvl1pPr>
+            <a:lvl2pPr marL="685800" indent="-228600" algn="l" defTabSz="914400" rtl="0" eaLnBrk="1" latinLnBrk="0" hangingPunct="1">
+              <a:lnSpc>
+                <a:spcPct val="90000"/>
+              </a:lnSpc>
+              <a:spcBef>
+                <a:spcPts val="500"/>
+              </a:spcBef>
+              <a:buFont typeface="Arial" panose="020B0604020202020204" pitchFamily="34" charset="0"/>
+              <a:buChar char="•"/>
+              <a:defRPr sz="2400" kern="1200">
+                <a:solidFill>
+                  <a:schemeClr val="tx1"/>
+                </a:solidFill>
+                <a:latin typeface="+mn-lt"/>
+                <a:ea typeface="+mn-ea"/>
+                <a:cs typeface="+mn-cs"/>
+              </a:defRPr>
+            </a:lvl2pPr>
+            <a:lvl3pPr marL="1143000" indent="-228600" algn="l" defTabSz="914400" rtl="0" eaLnBrk="1" latinLnBrk="0" hangingPunct="1">
+              <a:lnSpc>
+                <a:spcPct val="90000"/>
+              </a:lnSpc>
+              <a:spcBef>
+                <a:spcPts val="500"/>
+              </a:spcBef>
+              <a:buFont typeface="Arial" panose="020B0604020202020204" pitchFamily="34" charset="0"/>
+              <a:buChar char="•"/>
+              <a:defRPr sz="2000" kern="1200">
+                <a:solidFill>
+                  <a:schemeClr val="tx1"/>
+                </a:solidFill>
+                <a:latin typeface="+mn-lt"/>
+                <a:ea typeface="+mn-ea"/>
+                <a:cs typeface="+mn-cs"/>
+              </a:defRPr>
+            </a:lvl3pPr>
+            <a:lvl4pPr marL="1600200" indent="-228600" algn="l" defTabSz="914400" rtl="0" eaLnBrk="1" latinLnBrk="0" hangingPunct="1">
+              <a:lnSpc>
+                <a:spcPct val="90000"/>
+              </a:lnSpc>
+              <a:spcBef>
+                <a:spcPts val="500"/>
+              </a:spcBef>
+              <a:buFont typeface="Arial" panose="020B0604020202020204" pitchFamily="34" charset="0"/>
+              <a:buChar char="•"/>
+              <a:defRPr sz="1800" kern="1200">
+                <a:solidFill>
+                  <a:schemeClr val="tx1"/>
+                </a:solidFill>
+                <a:latin typeface="+mn-lt"/>
+                <a:ea typeface="+mn-ea"/>
+                <a:cs typeface="+mn-cs"/>
+              </a:defRPr>
+            </a:lvl4pPr>
+            <a:lvl5pPr marL="2057400" indent="-228600" algn="l" defTabSz="914400" rtl="0" eaLnBrk="1" latinLnBrk="0" hangingPunct="1">
+              <a:lnSpc>
+                <a:spcPct val="90000"/>
+              </a:lnSpc>
+              <a:spcBef>
+                <a:spcPts val="500"/>
+              </a:spcBef>
+              <a:buFont typeface="Arial" panose="020B0604020202020204" pitchFamily="34" charset="0"/>
+              <a:buChar char="•"/>
+              <a:defRPr sz="1800" kern="1200">
+                <a:solidFill>
+                  <a:schemeClr val="tx1"/>
+                </a:solidFill>
+                <a:latin typeface="+mn-lt"/>
+                <a:ea typeface="+mn-ea"/>
+                <a:cs typeface="+mn-cs"/>
+              </a:defRPr>
+            </a:lvl5pPr>
+            <a:lvl6pPr marL="2514600" indent="-228600" algn="l" defTabSz="914400" rtl="0" eaLnBrk="1" latinLnBrk="0" hangingPunct="1">
+              <a:lnSpc>
+                <a:spcPct val="90000"/>
+              </a:lnSpc>
+              <a:spcBef>
+                <a:spcPts val="500"/>
+              </a:spcBef>
+              <a:buFont typeface="Arial" panose="020B0604020202020204" pitchFamily="34" charset="0"/>
+              <a:buChar char="•"/>
+              <a:defRPr sz="1800" kern="1200">
+                <a:solidFill>
+                  <a:schemeClr val="tx1"/>
+                </a:solidFill>
+                <a:latin typeface="+mn-lt"/>
+                <a:ea typeface="+mn-ea"/>
+                <a:cs typeface="+mn-cs"/>
+              </a:defRPr>
+            </a:lvl6pPr>
+            <a:lvl7pPr marL="2971800" indent="-228600" algn="l" defTabSz="914400" rtl="0" eaLnBrk="1" latinLnBrk="0" hangingPunct="1">
+              <a:lnSpc>
+                <a:spcPct val="90000"/>
+              </a:lnSpc>
+              <a:spcBef>
+                <a:spcPts val="500"/>
+              </a:spcBef>
+              <a:buFont typeface="Arial" panose="020B0604020202020204" pitchFamily="34" charset="0"/>
+              <a:buChar char="•"/>
+              <a:defRPr sz="1800" kern="1200">
+                <a:solidFill>
+                  <a:schemeClr val="tx1"/>
+                </a:solidFill>
+                <a:latin typeface="+mn-lt"/>
+                <a:ea typeface="+mn-ea"/>
+                <a:cs typeface="+mn-cs"/>
+              </a:defRPr>
+            </a:lvl7pPr>
+            <a:lvl8pPr marL="3429000" indent="-228600" algn="l" defTabSz="914400" rtl="0" eaLnBrk="1" latinLnBrk="0" hangingPunct="1">
+              <a:lnSpc>
+                <a:spcPct val="90000"/>
+              </a:lnSpc>
+              <a:spcBef>
+                <a:spcPts val="500"/>
+              </a:spcBef>
+              <a:buFont typeface="Arial" panose="020B0604020202020204" pitchFamily="34" charset="0"/>
+              <a:buChar char="•"/>
+              <a:defRPr sz="1800" kern="1200">
+                <a:solidFill>
+                  <a:schemeClr val="tx1"/>
+                </a:solidFill>
+                <a:latin typeface="+mn-lt"/>
+                <a:ea typeface="+mn-ea"/>
+                <a:cs typeface="+mn-cs"/>
+              </a:defRPr>
+            </a:lvl8pPr>
+            <a:lvl9pPr marL="3886200" indent="-228600" algn="l" defTabSz="914400" rtl="0" eaLnBrk="1" latinLnBrk="0" hangingPunct="1">
+              <a:lnSpc>
+                <a:spcPct val="90000"/>
+              </a:lnSpc>
+              <a:spcBef>
+                <a:spcPts val="500"/>
+              </a:spcBef>
+              <a:buFont typeface="Arial" panose="020B0604020202020204" pitchFamily="34" charset="0"/>
+              <a:buChar char="•"/>
+              <a:defRPr sz="1800" kern="1200">
+                <a:solidFill>
+                  <a:schemeClr val="tx1"/>
+                </a:solidFill>
+                <a:latin typeface="+mn-lt"/>
+                <a:ea typeface="+mn-ea"/>
+                <a:cs typeface="+mn-cs"/>
+              </a:defRPr>
+            </a:lvl9pPr>
+          </a:lstStyle>
+          <a:p>
+            <a:r>
+              <a:rPr lang="en-US" dirty="0" smtClean="0"/>
+              <a:t>Combined </a:t>
+            </a:r>
+            <a:r>
+              <a:rPr lang="en-US" dirty="0" err="1" smtClean="0"/>
+              <a:t>trigo</a:t>
+            </a:r>
+            <a:r>
+              <a:rPr lang="en-US" dirty="0" smtClean="0"/>
+              <a:t> Fourier Series representation</a:t>
+            </a:r>
+            <a:endParaRPr lang="en-GB" dirty="0"/>
+          </a:p>
+        </p:txBody>
+      </p:sp>
+      <p:pic>
+        <p:nvPicPr>
+          <p:cNvPr id="9" name="Picture 8"/>
+          <p:cNvPicPr>
+            <a:picLocks noChangeAspect="1"/>
+          </p:cNvPicPr>
+          <p:nvPr/>
+        </p:nvPicPr>
+        <p:blipFill>
+          <a:blip r:embed="rId2"/>
+          <a:stretch>
+            <a:fillRect/>
+          </a:stretch>
+        </p:blipFill>
+        <p:spPr>
+          <a:xfrm>
+            <a:off x="6731438" y="872836"/>
+            <a:ext cx="5335859" cy="4419600"/>
+          </a:xfrm>
+          <a:prstGeom prst="rect">
+            <a:avLst/>
+          </a:prstGeom>
+        </p:spPr>
+      </p:pic>
+      <p:pic>
+        <p:nvPicPr>
+          <p:cNvPr id="10" name="Picture 9"/>
+          <p:cNvPicPr>
+            <a:picLocks noChangeAspect="1"/>
+          </p:cNvPicPr>
+          <p:nvPr/>
+        </p:nvPicPr>
+        <p:blipFill>
+          <a:blip r:embed="rId3"/>
+          <a:stretch>
+            <a:fillRect/>
+          </a:stretch>
+        </p:blipFill>
+        <p:spPr>
+          <a:xfrm>
+            <a:off x="233388" y="872835"/>
+            <a:ext cx="5446975" cy="4429051"/>
+          </a:xfrm>
+          <a:prstGeom prst="rect">
+            <a:avLst/>
+          </a:prstGeom>
+        </p:spPr>
+      </p:pic>
+    </p:spTree>
+    <p:extLst>
+      <p:ext uri="{BB962C8B-B14F-4D97-AF65-F5344CB8AC3E}">
+        <p14:creationId xmlns:p14="http://schemas.microsoft.com/office/powerpoint/2010/main" val="394186423"/>
       </p:ext>
     </p:extLst>
   </p:cSld>

</xml_diff>

<commit_message>
update graph left/right for nicer view
</commit_message>
<xml_diff>
--- a/FourierIntro_v1_CES.pptx
+++ b/FourierIntro_v1_CES.pptx
@@ -4,15 +4,19 @@
   <p:sldMasterIdLst>
     <p:sldMasterId id="2147483648" r:id="rId1"/>
   </p:sldMasterIdLst>
+  <p:notesMasterIdLst>
+    <p:notesMasterId r:id="rId11"/>
+  </p:notesMasterIdLst>
   <p:sldIdLst>
     <p:sldId id="256" r:id="rId2"/>
     <p:sldId id="257" r:id="rId3"/>
-    <p:sldId id="261" r:id="rId4"/>
-    <p:sldId id="262" r:id="rId5"/>
-    <p:sldId id="260" r:id="rId6"/>
-    <p:sldId id="263" r:id="rId7"/>
-    <p:sldId id="264" r:id="rId8"/>
-    <p:sldId id="265" r:id="rId9"/>
+    <p:sldId id="266" r:id="rId4"/>
+    <p:sldId id="261" r:id="rId5"/>
+    <p:sldId id="262" r:id="rId6"/>
+    <p:sldId id="264" r:id="rId7"/>
+    <p:sldId id="265" r:id="rId8"/>
+    <p:sldId id="263" r:id="rId9"/>
+    <p:sldId id="260" r:id="rId10"/>
   </p:sldIdLst>
   <p:sldSz cx="12192000" cy="6858000"/>
   <p:notesSz cx="6858000" cy="9144000"/>
@@ -119,6 +123,440 @@
 </p:presentation>
 </file>
 
+<file path=ppt/notesMasters/notesMaster1.xml><?xml version="1.0" encoding="utf-8"?>
+<p:notesMaster xmlns:a="http://schemas.openxmlformats.org/drawingml/2006/main" xmlns:r="http://schemas.openxmlformats.org/officeDocument/2006/relationships" xmlns:p="http://schemas.openxmlformats.org/presentationml/2006/main">
+  <p:cSld>
+    <p:bg>
+      <p:bgRef idx="1001">
+        <a:schemeClr val="bg1"/>
+      </p:bgRef>
+    </p:bg>
+    <p:spTree>
+      <p:nvGrpSpPr>
+        <p:cNvPr id="1" name=""/>
+        <p:cNvGrpSpPr/>
+        <p:nvPr/>
+      </p:nvGrpSpPr>
+      <p:grpSpPr>
+        <a:xfrm>
+          <a:off x="0" y="0"/>
+          <a:ext cx="0" cy="0"/>
+          <a:chOff x="0" y="0"/>
+          <a:chExt cx="0" cy="0"/>
+        </a:xfrm>
+      </p:grpSpPr>
+      <p:sp>
+        <p:nvSpPr>
+          <p:cNvPr id="2" name="Header Placeholder 1"/>
+          <p:cNvSpPr>
+            <a:spLocks noGrp="1"/>
+          </p:cNvSpPr>
+          <p:nvPr>
+            <p:ph type="hdr" sz="quarter"/>
+          </p:nvPr>
+        </p:nvSpPr>
+        <p:spPr>
+          <a:xfrm>
+            <a:off x="0" y="0"/>
+            <a:ext cx="2971800" cy="458788"/>
+          </a:xfrm>
+          <a:prstGeom prst="rect">
+            <a:avLst/>
+          </a:prstGeom>
+        </p:spPr>
+        <p:txBody>
+          <a:bodyPr vert="horz" lIns="91440" tIns="45720" rIns="91440" bIns="45720" rtlCol="0"/>
+          <a:lstStyle>
+            <a:lvl1pPr algn="l">
+              <a:defRPr sz="1200"/>
+            </a:lvl1pPr>
+          </a:lstStyle>
+          <a:p>
+            <a:endParaRPr lang="en-GB"/>
+          </a:p>
+        </p:txBody>
+      </p:sp>
+      <p:sp>
+        <p:nvSpPr>
+          <p:cNvPr id="3" name="Date Placeholder 2"/>
+          <p:cNvSpPr>
+            <a:spLocks noGrp="1"/>
+          </p:cNvSpPr>
+          <p:nvPr>
+            <p:ph type="dt" idx="1"/>
+          </p:nvPr>
+        </p:nvSpPr>
+        <p:spPr>
+          <a:xfrm>
+            <a:off x="3884613" y="0"/>
+            <a:ext cx="2971800" cy="458788"/>
+          </a:xfrm>
+          <a:prstGeom prst="rect">
+            <a:avLst/>
+          </a:prstGeom>
+        </p:spPr>
+        <p:txBody>
+          <a:bodyPr vert="horz" lIns="91440" tIns="45720" rIns="91440" bIns="45720" rtlCol="0"/>
+          <a:lstStyle>
+            <a:lvl1pPr algn="r">
+              <a:defRPr sz="1200"/>
+            </a:lvl1pPr>
+          </a:lstStyle>
+          <a:p>
+            <a:fld id="{D1226B4B-1D3E-4C2B-BE1D-46B76C016A79}" type="datetimeFigureOut">
+              <a:rPr lang="en-GB" smtClean="0"/>
+              <a:t>28/10/2018</a:t>
+            </a:fld>
+            <a:endParaRPr lang="en-GB"/>
+          </a:p>
+        </p:txBody>
+      </p:sp>
+      <p:sp>
+        <p:nvSpPr>
+          <p:cNvPr id="4" name="Slide Image Placeholder 3"/>
+          <p:cNvSpPr>
+            <a:spLocks noGrp="1" noRot="1" noChangeAspect="1"/>
+          </p:cNvSpPr>
+          <p:nvPr>
+            <p:ph type="sldImg" idx="2"/>
+          </p:nvPr>
+        </p:nvSpPr>
+        <p:spPr>
+          <a:xfrm>
+            <a:off x="685800" y="1143000"/>
+            <a:ext cx="5486400" cy="3086100"/>
+          </a:xfrm>
+          <a:prstGeom prst="rect">
+            <a:avLst/>
+          </a:prstGeom>
+          <a:noFill/>
+          <a:ln w="12700">
+            <a:solidFill>
+              <a:prstClr val="black"/>
+            </a:solidFill>
+          </a:ln>
+        </p:spPr>
+        <p:txBody>
+          <a:bodyPr vert="horz" lIns="91440" tIns="45720" rIns="91440" bIns="45720" rtlCol="0" anchor="ctr"/>
+          <a:lstStyle/>
+          <a:p>
+            <a:endParaRPr lang="en-GB"/>
+          </a:p>
+        </p:txBody>
+      </p:sp>
+      <p:sp>
+        <p:nvSpPr>
+          <p:cNvPr id="5" name="Notes Placeholder 4"/>
+          <p:cNvSpPr>
+            <a:spLocks noGrp="1"/>
+          </p:cNvSpPr>
+          <p:nvPr>
+            <p:ph type="body" sz="quarter" idx="3"/>
+          </p:nvPr>
+        </p:nvSpPr>
+        <p:spPr>
+          <a:xfrm>
+            <a:off x="685800" y="4400550"/>
+            <a:ext cx="5486400" cy="3600450"/>
+          </a:xfrm>
+          <a:prstGeom prst="rect">
+            <a:avLst/>
+          </a:prstGeom>
+        </p:spPr>
+        <p:txBody>
+          <a:bodyPr vert="horz" lIns="91440" tIns="45720" rIns="91440" bIns="45720" rtlCol="0"/>
+          <a:lstStyle/>
+          <a:p>
+            <a:pPr lvl="0"/>
+            <a:r>
+              <a:rPr lang="en-US" smtClean="0"/>
+              <a:t>Edit Master text styles</a:t>
+            </a:r>
+          </a:p>
+          <a:p>
+            <a:pPr lvl="1"/>
+            <a:r>
+              <a:rPr lang="en-US" smtClean="0"/>
+              <a:t>Second level</a:t>
+            </a:r>
+          </a:p>
+          <a:p>
+            <a:pPr lvl="2"/>
+            <a:r>
+              <a:rPr lang="en-US" smtClean="0"/>
+              <a:t>Third level</a:t>
+            </a:r>
+          </a:p>
+          <a:p>
+            <a:pPr lvl="3"/>
+            <a:r>
+              <a:rPr lang="en-US" smtClean="0"/>
+              <a:t>Fourth level</a:t>
+            </a:r>
+          </a:p>
+          <a:p>
+            <a:pPr lvl="4"/>
+            <a:r>
+              <a:rPr lang="en-US" smtClean="0"/>
+              <a:t>Fifth level</a:t>
+            </a:r>
+            <a:endParaRPr lang="en-GB"/>
+          </a:p>
+        </p:txBody>
+      </p:sp>
+      <p:sp>
+        <p:nvSpPr>
+          <p:cNvPr id="6" name="Footer Placeholder 5"/>
+          <p:cNvSpPr>
+            <a:spLocks noGrp="1"/>
+          </p:cNvSpPr>
+          <p:nvPr>
+            <p:ph type="ftr" sz="quarter" idx="4"/>
+          </p:nvPr>
+        </p:nvSpPr>
+        <p:spPr>
+          <a:xfrm>
+            <a:off x="0" y="8685213"/>
+            <a:ext cx="2971800" cy="458787"/>
+          </a:xfrm>
+          <a:prstGeom prst="rect">
+            <a:avLst/>
+          </a:prstGeom>
+        </p:spPr>
+        <p:txBody>
+          <a:bodyPr vert="horz" lIns="91440" tIns="45720" rIns="91440" bIns="45720" rtlCol="0" anchor="b"/>
+          <a:lstStyle>
+            <a:lvl1pPr algn="l">
+              <a:defRPr sz="1200"/>
+            </a:lvl1pPr>
+          </a:lstStyle>
+          <a:p>
+            <a:endParaRPr lang="en-GB"/>
+          </a:p>
+        </p:txBody>
+      </p:sp>
+      <p:sp>
+        <p:nvSpPr>
+          <p:cNvPr id="7" name="Slide Number Placeholder 6"/>
+          <p:cNvSpPr>
+            <a:spLocks noGrp="1"/>
+          </p:cNvSpPr>
+          <p:nvPr>
+            <p:ph type="sldNum" sz="quarter" idx="5"/>
+          </p:nvPr>
+        </p:nvSpPr>
+        <p:spPr>
+          <a:xfrm>
+            <a:off x="3884613" y="8685213"/>
+            <a:ext cx="2971800" cy="458787"/>
+          </a:xfrm>
+          <a:prstGeom prst="rect">
+            <a:avLst/>
+          </a:prstGeom>
+        </p:spPr>
+        <p:txBody>
+          <a:bodyPr vert="horz" lIns="91440" tIns="45720" rIns="91440" bIns="45720" rtlCol="0" anchor="b"/>
+          <a:lstStyle>
+            <a:lvl1pPr algn="r">
+              <a:defRPr sz="1200"/>
+            </a:lvl1pPr>
+          </a:lstStyle>
+          <a:p>
+            <a:fld id="{3C75A838-2DBD-45B8-816F-6623DCD8B889}" type="slidenum">
+              <a:rPr lang="en-GB" smtClean="0"/>
+              <a:t>‹#›</a:t>
+            </a:fld>
+            <a:endParaRPr lang="en-GB"/>
+          </a:p>
+        </p:txBody>
+      </p:sp>
+    </p:spTree>
+    <p:extLst>
+      <p:ext uri="{BB962C8B-B14F-4D97-AF65-F5344CB8AC3E}">
+        <p14:creationId xmlns:p14="http://schemas.microsoft.com/office/powerpoint/2010/main" val="3073874117"/>
+      </p:ext>
+    </p:extLst>
+  </p:cSld>
+  <p:clrMap bg1="lt1" tx1="dk1" bg2="lt2" tx2="dk2" accent1="accent1" accent2="accent2" accent3="accent3" accent4="accent4" accent5="accent5" accent6="accent6" hlink="hlink" folHlink="folHlink"/>
+  <p:notesStyle>
+    <a:lvl1pPr marL="0" algn="l" defTabSz="914400" rtl="0" eaLnBrk="1" latinLnBrk="0" hangingPunct="1">
+      <a:defRPr sz="1200" kern="1200">
+        <a:solidFill>
+          <a:schemeClr val="tx1"/>
+        </a:solidFill>
+        <a:latin typeface="+mn-lt"/>
+        <a:ea typeface="+mn-ea"/>
+        <a:cs typeface="+mn-cs"/>
+      </a:defRPr>
+    </a:lvl1pPr>
+    <a:lvl2pPr marL="457200" algn="l" defTabSz="914400" rtl="0" eaLnBrk="1" latinLnBrk="0" hangingPunct="1">
+      <a:defRPr sz="1200" kern="1200">
+        <a:solidFill>
+          <a:schemeClr val="tx1"/>
+        </a:solidFill>
+        <a:latin typeface="+mn-lt"/>
+        <a:ea typeface="+mn-ea"/>
+        <a:cs typeface="+mn-cs"/>
+      </a:defRPr>
+    </a:lvl2pPr>
+    <a:lvl3pPr marL="914400" algn="l" defTabSz="914400" rtl="0" eaLnBrk="1" latinLnBrk="0" hangingPunct="1">
+      <a:defRPr sz="1200" kern="1200">
+        <a:solidFill>
+          <a:schemeClr val="tx1"/>
+        </a:solidFill>
+        <a:latin typeface="+mn-lt"/>
+        <a:ea typeface="+mn-ea"/>
+        <a:cs typeface="+mn-cs"/>
+      </a:defRPr>
+    </a:lvl3pPr>
+    <a:lvl4pPr marL="1371600" algn="l" defTabSz="914400" rtl="0" eaLnBrk="1" latinLnBrk="0" hangingPunct="1">
+      <a:defRPr sz="1200" kern="1200">
+        <a:solidFill>
+          <a:schemeClr val="tx1"/>
+        </a:solidFill>
+        <a:latin typeface="+mn-lt"/>
+        <a:ea typeface="+mn-ea"/>
+        <a:cs typeface="+mn-cs"/>
+      </a:defRPr>
+    </a:lvl4pPr>
+    <a:lvl5pPr marL="1828800" algn="l" defTabSz="914400" rtl="0" eaLnBrk="1" latinLnBrk="0" hangingPunct="1">
+      <a:defRPr sz="1200" kern="1200">
+        <a:solidFill>
+          <a:schemeClr val="tx1"/>
+        </a:solidFill>
+        <a:latin typeface="+mn-lt"/>
+        <a:ea typeface="+mn-ea"/>
+        <a:cs typeface="+mn-cs"/>
+      </a:defRPr>
+    </a:lvl5pPr>
+    <a:lvl6pPr marL="2286000" algn="l" defTabSz="914400" rtl="0" eaLnBrk="1" latinLnBrk="0" hangingPunct="1">
+      <a:defRPr sz="1200" kern="1200">
+        <a:solidFill>
+          <a:schemeClr val="tx1"/>
+        </a:solidFill>
+        <a:latin typeface="+mn-lt"/>
+        <a:ea typeface="+mn-ea"/>
+        <a:cs typeface="+mn-cs"/>
+      </a:defRPr>
+    </a:lvl6pPr>
+    <a:lvl7pPr marL="2743200" algn="l" defTabSz="914400" rtl="0" eaLnBrk="1" latinLnBrk="0" hangingPunct="1">
+      <a:defRPr sz="1200" kern="1200">
+        <a:solidFill>
+          <a:schemeClr val="tx1"/>
+        </a:solidFill>
+        <a:latin typeface="+mn-lt"/>
+        <a:ea typeface="+mn-ea"/>
+        <a:cs typeface="+mn-cs"/>
+      </a:defRPr>
+    </a:lvl7pPr>
+    <a:lvl8pPr marL="3200400" algn="l" defTabSz="914400" rtl="0" eaLnBrk="1" latinLnBrk="0" hangingPunct="1">
+      <a:defRPr sz="1200" kern="1200">
+        <a:solidFill>
+          <a:schemeClr val="tx1"/>
+        </a:solidFill>
+        <a:latin typeface="+mn-lt"/>
+        <a:ea typeface="+mn-ea"/>
+        <a:cs typeface="+mn-cs"/>
+      </a:defRPr>
+    </a:lvl8pPr>
+    <a:lvl9pPr marL="3657600" algn="l" defTabSz="914400" rtl="0" eaLnBrk="1" latinLnBrk="0" hangingPunct="1">
+      <a:defRPr sz="1200" kern="1200">
+        <a:solidFill>
+          <a:schemeClr val="tx1"/>
+        </a:solidFill>
+        <a:latin typeface="+mn-lt"/>
+        <a:ea typeface="+mn-ea"/>
+        <a:cs typeface="+mn-cs"/>
+      </a:defRPr>
+    </a:lvl9pPr>
+  </p:notesStyle>
+</p:notesMaster>
+</file>
+
+<file path=ppt/notesSlides/notesSlide1.xml><?xml version="1.0" encoding="utf-8"?>
+<p:notes xmlns:a="http://schemas.openxmlformats.org/drawingml/2006/main" xmlns:r="http://schemas.openxmlformats.org/officeDocument/2006/relationships" xmlns:p="http://schemas.openxmlformats.org/presentationml/2006/main">
+  <p:cSld>
+    <p:spTree>
+      <p:nvGrpSpPr>
+        <p:cNvPr id="1" name=""/>
+        <p:cNvGrpSpPr/>
+        <p:nvPr/>
+      </p:nvGrpSpPr>
+      <p:grpSpPr>
+        <a:xfrm>
+          <a:off x="0" y="0"/>
+          <a:ext cx="0" cy="0"/>
+          <a:chOff x="0" y="0"/>
+          <a:chExt cx="0" cy="0"/>
+        </a:xfrm>
+      </p:grpSpPr>
+      <p:sp>
+        <p:nvSpPr>
+          <p:cNvPr id="2" name="Slide Image Placeholder 1"/>
+          <p:cNvSpPr>
+            <a:spLocks noGrp="1" noRot="1" noChangeAspect="1"/>
+          </p:cNvSpPr>
+          <p:nvPr>
+            <p:ph type="sldImg"/>
+          </p:nvPr>
+        </p:nvSpPr>
+        <p:spPr/>
+      </p:sp>
+      <p:sp>
+        <p:nvSpPr>
+          <p:cNvPr id="3" name="Notes Placeholder 2"/>
+          <p:cNvSpPr>
+            <a:spLocks noGrp="1"/>
+          </p:cNvSpPr>
+          <p:nvPr>
+            <p:ph type="body" idx="1"/>
+          </p:nvPr>
+        </p:nvSpPr>
+        <p:spPr/>
+        <p:txBody>
+          <a:bodyPr/>
+          <a:lstStyle/>
+          <a:p>
+            <a:endParaRPr lang="en-GB" dirty="0"/>
+          </a:p>
+        </p:txBody>
+      </p:sp>
+      <p:sp>
+        <p:nvSpPr>
+          <p:cNvPr id="4" name="Slide Number Placeholder 3"/>
+          <p:cNvSpPr>
+            <a:spLocks noGrp="1"/>
+          </p:cNvSpPr>
+          <p:nvPr>
+            <p:ph type="sldNum" sz="quarter" idx="10"/>
+          </p:nvPr>
+        </p:nvSpPr>
+        <p:spPr/>
+        <p:txBody>
+          <a:bodyPr/>
+          <a:lstStyle/>
+          <a:p>
+            <a:fld id="{3C75A838-2DBD-45B8-816F-6623DCD8B889}" type="slidenum">
+              <a:rPr lang="en-GB" smtClean="0"/>
+              <a:t>3</a:t>
+            </a:fld>
+            <a:endParaRPr lang="en-GB"/>
+          </a:p>
+        </p:txBody>
+      </p:sp>
+    </p:spTree>
+    <p:extLst>
+      <p:ext uri="{BB962C8B-B14F-4D97-AF65-F5344CB8AC3E}">
+        <p14:creationId xmlns:p14="http://schemas.microsoft.com/office/powerpoint/2010/main" val="4103971871"/>
+      </p:ext>
+    </p:extLst>
+  </p:cSld>
+  <p:clrMapOvr>
+    <a:masterClrMapping/>
+  </p:clrMapOvr>
+</p:notes>
+</file>
+
 <file path=ppt/slideLayouts/slideLayout1.xml><?xml version="1.0" encoding="utf-8"?>
 <p:sldLayout xmlns:a="http://schemas.openxmlformats.org/drawingml/2006/main" xmlns:r="http://schemas.openxmlformats.org/officeDocument/2006/relationships" xmlns:p="http://schemas.openxmlformats.org/presentationml/2006/main" type="title" preserve="1">
   <p:cSld name="Title Slide">
@@ -248,9 +686,9 @@
           <a:bodyPr/>
           <a:lstStyle/>
           <a:p>
-            <a:fld id="{2D40B193-DB81-4E09-BEF4-825FB5F11C31}" type="datetimeFigureOut">
+            <a:fld id="{732F26F4-DAD5-4DB0-9509-DFFDE1D92531}" type="datetime1">
               <a:rPr lang="en-GB" smtClean="0"/>
-              <a:t>25/10/2018</a:t>
+              <a:t>28/10/2018</a:t>
             </a:fld>
             <a:endParaRPr lang="en-GB"/>
           </a:p>
@@ -418,9 +856,9 @@
           <a:bodyPr/>
           <a:lstStyle/>
           <a:p>
-            <a:fld id="{2D40B193-DB81-4E09-BEF4-825FB5F11C31}" type="datetimeFigureOut">
+            <a:fld id="{CA819D38-EDE7-40DF-94D8-1B304B78A10E}" type="datetime1">
               <a:rPr lang="en-GB" smtClean="0"/>
-              <a:t>25/10/2018</a:t>
+              <a:t>28/10/2018</a:t>
             </a:fld>
             <a:endParaRPr lang="en-GB"/>
           </a:p>
@@ -598,9 +1036,9 @@
           <a:bodyPr/>
           <a:lstStyle/>
           <a:p>
-            <a:fld id="{2D40B193-DB81-4E09-BEF4-825FB5F11C31}" type="datetimeFigureOut">
+            <a:fld id="{05CF163C-52E0-4A36-AA49-06F6F39A2A2C}" type="datetime1">
               <a:rPr lang="en-GB" smtClean="0"/>
-              <a:t>25/10/2018</a:t>
+              <a:t>28/10/2018</a:t>
             </a:fld>
             <a:endParaRPr lang="en-GB"/>
           </a:p>
@@ -768,9 +1206,9 @@
           <a:bodyPr/>
           <a:lstStyle/>
           <a:p>
-            <a:fld id="{2D40B193-DB81-4E09-BEF4-825FB5F11C31}" type="datetimeFigureOut">
+            <a:fld id="{FBB8253C-77FD-438D-9EF6-2DA83C2B2E1B}" type="datetime1">
               <a:rPr lang="en-GB" smtClean="0"/>
-              <a:t>25/10/2018</a:t>
+              <a:t>28/10/2018</a:t>
             </a:fld>
             <a:endParaRPr lang="en-GB"/>
           </a:p>
@@ -1014,9 +1452,9 @@
           <a:bodyPr/>
           <a:lstStyle/>
           <a:p>
-            <a:fld id="{2D40B193-DB81-4E09-BEF4-825FB5F11C31}" type="datetimeFigureOut">
+            <a:fld id="{6EDB244C-6853-48FB-89F5-56DFC2C879DA}" type="datetime1">
               <a:rPr lang="en-GB" smtClean="0"/>
-              <a:t>25/10/2018</a:t>
+              <a:t>28/10/2018</a:t>
             </a:fld>
             <a:endParaRPr lang="en-GB"/>
           </a:p>
@@ -1246,9 +1684,9 @@
           <a:bodyPr/>
           <a:lstStyle/>
           <a:p>
-            <a:fld id="{2D40B193-DB81-4E09-BEF4-825FB5F11C31}" type="datetimeFigureOut">
+            <a:fld id="{0262C71A-24B4-45AC-9304-11BB27C6281E}" type="datetime1">
               <a:rPr lang="en-GB" smtClean="0"/>
-              <a:t>25/10/2018</a:t>
+              <a:t>28/10/2018</a:t>
             </a:fld>
             <a:endParaRPr lang="en-GB"/>
           </a:p>
@@ -1613,9 +2051,9 @@
           <a:bodyPr/>
           <a:lstStyle/>
           <a:p>
-            <a:fld id="{2D40B193-DB81-4E09-BEF4-825FB5F11C31}" type="datetimeFigureOut">
+            <a:fld id="{24FE66EC-2A12-4C34-B5B0-1CE9B80416D8}" type="datetime1">
               <a:rPr lang="en-GB" smtClean="0"/>
-              <a:t>25/10/2018</a:t>
+              <a:t>28/10/2018</a:t>
             </a:fld>
             <a:endParaRPr lang="en-GB"/>
           </a:p>
@@ -1731,9 +2169,9 @@
           <a:bodyPr/>
           <a:lstStyle/>
           <a:p>
-            <a:fld id="{2D40B193-DB81-4E09-BEF4-825FB5F11C31}" type="datetimeFigureOut">
+            <a:fld id="{389F123F-1100-4DBE-A771-22CE3B0DB82D}" type="datetime1">
               <a:rPr lang="en-GB" smtClean="0"/>
-              <a:t>25/10/2018</a:t>
+              <a:t>28/10/2018</a:t>
             </a:fld>
             <a:endParaRPr lang="en-GB"/>
           </a:p>
@@ -1826,9 +2264,9 @@
           <a:bodyPr/>
           <a:lstStyle/>
           <a:p>
-            <a:fld id="{2D40B193-DB81-4E09-BEF4-825FB5F11C31}" type="datetimeFigureOut">
+            <a:fld id="{9F7ADDF2-17A8-4BA5-87E1-23E97980C7BA}" type="datetime1">
               <a:rPr lang="en-GB" smtClean="0"/>
-              <a:t>25/10/2018</a:t>
+              <a:t>28/10/2018</a:t>
             </a:fld>
             <a:endParaRPr lang="en-GB"/>
           </a:p>
@@ -2103,9 +2541,9 @@
           <a:bodyPr/>
           <a:lstStyle/>
           <a:p>
-            <a:fld id="{2D40B193-DB81-4E09-BEF4-825FB5F11C31}" type="datetimeFigureOut">
+            <a:fld id="{FAF8DCB0-7B6D-47B0-9105-A41D97D031CC}" type="datetime1">
               <a:rPr lang="en-GB" smtClean="0"/>
-              <a:t>25/10/2018</a:t>
+              <a:t>28/10/2018</a:t>
             </a:fld>
             <a:endParaRPr lang="en-GB"/>
           </a:p>
@@ -2356,9 +2794,9 @@
           <a:bodyPr/>
           <a:lstStyle/>
           <a:p>
-            <a:fld id="{2D40B193-DB81-4E09-BEF4-825FB5F11C31}" type="datetimeFigureOut">
+            <a:fld id="{62BB675F-C3A5-407E-AAD8-38D9FB574E39}" type="datetime1">
               <a:rPr lang="en-GB" smtClean="0"/>
-              <a:t>25/10/2018</a:t>
+              <a:t>28/10/2018</a:t>
             </a:fld>
             <a:endParaRPr lang="en-GB"/>
           </a:p>
@@ -2569,9 +3007,9 @@
             </a:lvl1pPr>
           </a:lstStyle>
           <a:p>
-            <a:fld id="{2D40B193-DB81-4E09-BEF4-825FB5F11C31}" type="datetimeFigureOut">
+            <a:fld id="{7F695EC0-8A35-4FD2-A7DF-C06A5A65C388}" type="datetime1">
               <a:rPr lang="en-GB" smtClean="0"/>
-              <a:t>25/10/2018</a:t>
+              <a:t>28/10/2018</a:t>
             </a:fld>
             <a:endParaRPr lang="en-GB"/>
           </a:p>
@@ -2676,6 +3114,7 @@
     <p:sldLayoutId id="2147483658" r:id="rId10"/>
     <p:sldLayoutId id="2147483659" r:id="rId11"/>
   </p:sldLayoutIdLst>
+  <p:hf hdr="0" ftr="0" dt="0"/>
   <p:txStyles>
     <p:titleStyle>
       <a:lvl1pPr algn="l" defTabSz="914400" rtl="0" eaLnBrk="1" latinLnBrk="0" hangingPunct="1">
@@ -2986,39 +3425,102 @@
             <p:ph type="ctrTitle"/>
           </p:nvPr>
         </p:nvSpPr>
+        <p:spPr>
+          <a:xfrm>
+            <a:off x="1274618" y="318799"/>
+            <a:ext cx="9144000" cy="2387600"/>
+          </a:xfrm>
+        </p:spPr>
+        <p:txBody>
+          <a:bodyPr/>
+          <a:lstStyle/>
+          <a:p>
+            <a:r>
+              <a:rPr lang="en-US" dirty="0" smtClean="0"/>
+              <a:t>What is Fourier Transform?</a:t>
+            </a:r>
+            <a:br>
+              <a:rPr lang="en-US" dirty="0" smtClean="0"/>
+            </a:br>
+            <a:r>
+              <a:rPr lang="en-US" dirty="0" smtClean="0"/>
+              <a:t>An intuitive interpretation</a:t>
+            </a:r>
+            <a:endParaRPr lang="en-GB" dirty="0"/>
+          </a:p>
+        </p:txBody>
+      </p:sp>
+      <p:sp>
+        <p:nvSpPr>
+          <p:cNvPr id="3" name="Subtitle 2"/>
+          <p:cNvSpPr>
+            <a:spLocks noGrp="1"/>
+          </p:cNvSpPr>
+          <p:nvPr>
+            <p:ph type="subTitle" idx="1"/>
+          </p:nvPr>
+        </p:nvSpPr>
         <p:spPr/>
         <p:txBody>
+          <a:bodyPr>
+            <a:normAutofit fontScale="77500" lnSpcReduction="20000"/>
+          </a:bodyPr>
+          <a:lstStyle/>
+          <a:p>
+            <a:r>
+              <a:rPr lang="en-US" dirty="0" smtClean="0"/>
+              <a:t>Chng </a:t>
+            </a:r>
+            <a:r>
+              <a:rPr lang="en-US" dirty="0" err="1" smtClean="0"/>
+              <a:t>Eng</a:t>
+            </a:r>
+            <a:r>
+              <a:rPr lang="en-US" dirty="0" smtClean="0"/>
+              <a:t> Siong</a:t>
+            </a:r>
+          </a:p>
+          <a:p>
+            <a:endParaRPr lang="en-US" dirty="0"/>
+          </a:p>
+          <a:p>
+            <a:r>
+              <a:rPr lang="en-US" dirty="0" smtClean="0"/>
+              <a:t>NTU</a:t>
+            </a:r>
+          </a:p>
+          <a:p>
+            <a:endParaRPr lang="en-US" dirty="0"/>
+          </a:p>
+          <a:p>
+            <a:r>
+              <a:rPr lang="en-US" dirty="0" smtClean="0"/>
+              <a:t>Oct 2018</a:t>
+            </a:r>
+            <a:endParaRPr lang="en-GB" dirty="0"/>
+          </a:p>
+        </p:txBody>
+      </p:sp>
+      <p:sp>
+        <p:nvSpPr>
+          <p:cNvPr id="4" name="Slide Number Placeholder 3"/>
+          <p:cNvSpPr>
+            <a:spLocks noGrp="1"/>
+          </p:cNvSpPr>
+          <p:nvPr>
+            <p:ph type="sldNum" sz="quarter" idx="12"/>
+          </p:nvPr>
+        </p:nvSpPr>
+        <p:spPr/>
+        <p:txBody>
           <a:bodyPr/>
           <a:lstStyle/>
           <a:p>
-            <a:r>
-              <a:rPr lang="en-US" dirty="0" smtClean="0"/>
-              <a:t>What is Fourier Transform</a:t>
-            </a:r>
-            <a:endParaRPr lang="en-GB" dirty="0"/>
-          </a:p>
-        </p:txBody>
-      </p:sp>
-      <p:sp>
-        <p:nvSpPr>
-          <p:cNvPr id="3" name="Subtitle 2"/>
-          <p:cNvSpPr>
-            <a:spLocks noGrp="1"/>
-          </p:cNvSpPr>
-          <p:nvPr>
-            <p:ph type="subTitle" idx="1"/>
-          </p:nvPr>
-        </p:nvSpPr>
-        <p:spPr/>
-        <p:txBody>
-          <a:bodyPr/>
-          <a:lstStyle/>
-          <a:p>
-            <a:r>
-              <a:rPr lang="en-US" dirty="0" smtClean="0"/>
-              <a:t>CES</a:t>
-            </a:r>
-            <a:endParaRPr lang="en-GB" dirty="0"/>
+            <a:fld id="{10F1DA42-9B2A-4636-961F-FFD9F81D915F}" type="slidenum">
+              <a:rPr lang="en-GB" smtClean="0"/>
+              <a:t>1</a:t>
+            </a:fld>
+            <a:endParaRPr lang="en-GB"/>
           </a:p>
         </p:txBody>
       </p:sp>
@@ -3062,238 +3564,552 @@
             <p:ph type="title"/>
           </p:nvPr>
         </p:nvSpPr>
+        <p:spPr>
+          <a:xfrm>
+            <a:off x="117764" y="0"/>
+            <a:ext cx="10515600" cy="1325563"/>
+          </a:xfrm>
+        </p:spPr>
+        <p:txBody>
+          <a:bodyPr/>
+          <a:lstStyle/>
+          <a:p>
+            <a:r>
+              <a:rPr lang="en-US" dirty="0" smtClean="0"/>
+              <a:t>Fourier Transform: </a:t>
+            </a:r>
+            <a:br>
+              <a:rPr lang="en-US" dirty="0" smtClean="0"/>
+            </a:br>
+            <a:r>
+              <a:rPr lang="en-US" sz="3600" dirty="0" smtClean="0"/>
+              <a:t>Questions we wish to answer</a:t>
+            </a:r>
+            <a:endParaRPr lang="en-GB" sz="3600" dirty="0"/>
+          </a:p>
+        </p:txBody>
+      </p:sp>
+      <mc:AlternateContent xmlns:mc="http://schemas.openxmlformats.org/markup-compatibility/2006" xmlns:a14="http://schemas.microsoft.com/office/drawing/2010/main">
+        <mc:Choice Requires="a14">
+          <p:sp>
+            <p:nvSpPr>
+              <p:cNvPr id="3" name="Content Placeholder 2"/>
+              <p:cNvSpPr>
+                <a:spLocks noGrp="1"/>
+              </p:cNvSpPr>
+              <p:nvPr>
+                <p:ph idx="1"/>
+              </p:nvPr>
+            </p:nvSpPr>
+            <p:spPr>
+              <a:xfrm>
+                <a:off x="838200" y="1423844"/>
+                <a:ext cx="10515600" cy="4351338"/>
+              </a:xfrm>
+            </p:spPr>
+            <p:txBody>
+              <a:bodyPr>
+                <a:noAutofit/>
+              </a:bodyPr>
+              <a:lstStyle/>
+              <a:p>
+                <a:pPr marL="0" indent="0">
+                  <a:buNone/>
+                </a:pPr>
+                <a:r>
+                  <a:rPr lang="en-US" sz="2000" dirty="0" smtClean="0"/>
+                  <a:t>1)   What </a:t>
+                </a:r>
+                <a:r>
+                  <a:rPr lang="en-US" sz="2000" dirty="0"/>
+                  <a:t>does Fourier Transform do</a:t>
+                </a:r>
+                <a:r>
+                  <a:rPr lang="en-US" sz="2000" dirty="0" smtClean="0"/>
+                  <a:t>?</a:t>
+                </a:r>
+              </a:p>
+              <a:p>
+                <a:pPr marL="914400" lvl="1" indent="-457200">
+                  <a:buAutoNum type="alphaLcParenR"/>
+                </a:pPr>
+                <a:r>
+                  <a:rPr lang="en-US" sz="1600" dirty="0" smtClean="0"/>
+                  <a:t>Analysis and Synthesis equation</a:t>
+                </a:r>
+              </a:p>
+              <a:p>
+                <a:pPr marL="457200" lvl="1" indent="0">
+                  <a:buNone/>
+                </a:pPr>
+                <a:endParaRPr lang="en-US" sz="1600" dirty="0"/>
+              </a:p>
+              <a:p>
+                <a:pPr marL="0" indent="0">
+                  <a:buNone/>
+                </a:pPr>
+                <a:r>
+                  <a:rPr lang="en-US" sz="2000" dirty="0" smtClean="0"/>
+                  <a:t>2)    What is time and frequency representation? Of a signal</a:t>
+                </a:r>
+              </a:p>
+              <a:p>
+                <a:pPr marL="0" indent="0">
+                  <a:buNone/>
+                </a:pPr>
+                <a:r>
+                  <a:rPr lang="en-US" sz="2000" dirty="0" smtClean="0"/>
+                  <a:t>3)    How many types of Fourier Transform? Fourier Series, Fourier Transform for CT and DT signals</a:t>
+                </a:r>
+              </a:p>
+              <a:p>
+                <a:pPr marL="0" indent="0">
+                  <a:buNone/>
+                </a:pPr>
+                <a:endParaRPr lang="en-US" sz="2000" dirty="0" smtClean="0"/>
+              </a:p>
+              <a:p>
+                <a:pPr marL="0" indent="0">
+                  <a:buNone/>
+                </a:pPr>
+                <a:r>
+                  <a:rPr lang="en-US" sz="2000" dirty="0" smtClean="0"/>
+                  <a:t>4)    Examples </a:t>
+                </a:r>
+                <a:endParaRPr lang="en-US" sz="2000" dirty="0"/>
+              </a:p>
+              <a:p>
+                <a:pPr marL="0" indent="0">
+                  <a:buNone/>
+                </a:pPr>
+                <a:r>
+                  <a:rPr lang="en-US" sz="2000" dirty="0" smtClean="0"/>
+                  <a:t>	4a) What is the Fourier Series representation of </a:t>
+                </a:r>
+                <a:endParaRPr lang="en-US" sz="2000" b="0" i="1" dirty="0" smtClean="0">
+                  <a:latin typeface="Cambria Math" panose="02040503050406030204" pitchFamily="18" charset="0"/>
+                </a:endParaRPr>
+              </a:p>
+              <a:p>
+                <a:pPr marL="0" indent="0">
+                  <a:buNone/>
+                </a:pPr>
+                <a14:m>
+                  <m:oMathPara xmlns:m="http://schemas.openxmlformats.org/officeDocument/2006/math">
+                    <m:oMathParaPr>
+                      <m:jc m:val="centerGroup"/>
+                    </m:oMathParaPr>
+                    <m:oMath xmlns:m="http://schemas.openxmlformats.org/officeDocument/2006/math">
+                      <m:r>
+                        <a:rPr lang="en-US" sz="2000" b="0" i="1" smtClean="0">
+                          <a:latin typeface="Cambria Math" panose="02040503050406030204" pitchFamily="18" charset="0"/>
+                        </a:rPr>
+                        <m:t>𝑥</m:t>
+                      </m:r>
+                      <m:d>
+                        <m:dPr>
+                          <m:ctrlPr>
+                            <a:rPr lang="en-US" sz="2000" b="0" i="1" smtClean="0">
+                              <a:latin typeface="Cambria Math" panose="02040503050406030204" pitchFamily="18" charset="0"/>
+                            </a:rPr>
+                          </m:ctrlPr>
+                        </m:dPr>
+                        <m:e>
+                          <m:r>
+                            <a:rPr lang="en-US" sz="2000" b="0" i="1" smtClean="0">
+                              <a:latin typeface="Cambria Math" panose="02040503050406030204" pitchFamily="18" charset="0"/>
+                            </a:rPr>
+                            <m:t>𝑡</m:t>
+                          </m:r>
+                        </m:e>
+                      </m:d>
+                      <m:r>
+                        <a:rPr lang="en-US" sz="2000" b="0" i="1" smtClean="0">
+                          <a:latin typeface="Cambria Math" panose="02040503050406030204" pitchFamily="18" charset="0"/>
+                        </a:rPr>
+                        <m:t>=10+3</m:t>
+                      </m:r>
+                      <m:func>
+                        <m:funcPr>
+                          <m:ctrlPr>
+                            <a:rPr lang="en-US" sz="2000" b="0" i="1" smtClean="0">
+                              <a:latin typeface="Cambria Math" panose="02040503050406030204" pitchFamily="18" charset="0"/>
+                            </a:rPr>
+                          </m:ctrlPr>
+                        </m:funcPr>
+                        <m:fName>
+                          <m:r>
+                            <m:rPr>
+                              <m:sty m:val="p"/>
+                            </m:rPr>
+                            <a:rPr lang="en-US" sz="2000" b="0" i="0" smtClean="0">
+                              <a:latin typeface="Cambria Math" panose="02040503050406030204" pitchFamily="18" charset="0"/>
+                            </a:rPr>
+                            <m:t>cos</m:t>
+                          </m:r>
+                        </m:fName>
+                        <m:e>
+                          <m:d>
+                            <m:dPr>
+                              <m:ctrlPr>
+                                <a:rPr lang="en-US" sz="2000" b="0" i="1" smtClean="0">
+                                  <a:latin typeface="Cambria Math" panose="02040503050406030204" pitchFamily="18" charset="0"/>
+                                </a:rPr>
+                              </m:ctrlPr>
+                            </m:dPr>
+                            <m:e>
+                              <m:sSub>
+                                <m:sSubPr>
+                                  <m:ctrlPr>
+                                    <a:rPr lang="en-US" sz="2000" b="0" i="1" smtClean="0">
+                                      <a:latin typeface="Cambria Math" panose="02040503050406030204" pitchFamily="18" charset="0"/>
+                                    </a:rPr>
+                                  </m:ctrlPr>
+                                </m:sSubPr>
+                                <m:e>
+                                  <m:r>
+                                    <m:rPr>
+                                      <m:sty m:val="p"/>
+                                    </m:rPr>
+                                    <a:rPr lang="en-US" sz="2000" b="0" i="0" smtClean="0">
+                                      <a:latin typeface="Cambria Math" panose="02040503050406030204" pitchFamily="18" charset="0"/>
+                                    </a:rPr>
+                                    <m:t>Ω</m:t>
+                                  </m:r>
+                                </m:e>
+                                <m:sub>
+                                  <m:r>
+                                    <a:rPr lang="en-US" sz="2000" b="0" i="1" smtClean="0">
+                                      <a:latin typeface="Cambria Math" panose="02040503050406030204" pitchFamily="18" charset="0"/>
+                                    </a:rPr>
+                                    <m:t>0</m:t>
+                                  </m:r>
+                                </m:sub>
+                              </m:sSub>
+                              <m:r>
+                                <a:rPr lang="en-US" sz="2000" b="0" i="1" smtClean="0">
+                                  <a:latin typeface="Cambria Math" panose="02040503050406030204" pitchFamily="18" charset="0"/>
+                                </a:rPr>
+                                <m:t>𝑡</m:t>
+                              </m:r>
+                            </m:e>
+                          </m:d>
+                        </m:e>
+                      </m:func>
+                      <m:r>
+                        <a:rPr lang="en-US" sz="2000" b="0" i="1" smtClean="0">
+                          <a:latin typeface="Cambria Math" panose="02040503050406030204" pitchFamily="18" charset="0"/>
+                        </a:rPr>
+                        <m:t>+5</m:t>
+                      </m:r>
+                      <m:func>
+                        <m:funcPr>
+                          <m:ctrlPr>
+                            <a:rPr lang="en-US" sz="2000" b="0" i="1" smtClean="0">
+                              <a:latin typeface="Cambria Math" panose="02040503050406030204" pitchFamily="18" charset="0"/>
+                            </a:rPr>
+                          </m:ctrlPr>
+                        </m:funcPr>
+                        <m:fName>
+                          <m:r>
+                            <m:rPr>
+                              <m:sty m:val="p"/>
+                            </m:rPr>
+                            <a:rPr lang="en-US" sz="2000" b="0" i="0" smtClean="0">
+                              <a:latin typeface="Cambria Math" panose="02040503050406030204" pitchFamily="18" charset="0"/>
+                            </a:rPr>
+                            <m:t>cos</m:t>
+                          </m:r>
+                        </m:fName>
+                        <m:e>
+                          <m:d>
+                            <m:dPr>
+                              <m:ctrlPr>
+                                <a:rPr lang="en-US" sz="2000" b="0" i="1" smtClean="0">
+                                  <a:latin typeface="Cambria Math" panose="02040503050406030204" pitchFamily="18" charset="0"/>
+                                </a:rPr>
+                              </m:ctrlPr>
+                            </m:dPr>
+                            <m:e>
+                              <m:r>
+                                <a:rPr lang="en-US" sz="2000" b="0" i="1" smtClean="0">
+                                  <a:latin typeface="Cambria Math" panose="02040503050406030204" pitchFamily="18" charset="0"/>
+                                </a:rPr>
+                                <m:t>2</m:t>
+                              </m:r>
+                              <m:sSub>
+                                <m:sSubPr>
+                                  <m:ctrlPr>
+                                    <a:rPr lang="en-US" sz="2000" b="0" i="1" smtClean="0">
+                                      <a:latin typeface="Cambria Math" panose="02040503050406030204" pitchFamily="18" charset="0"/>
+                                    </a:rPr>
+                                  </m:ctrlPr>
+                                </m:sSubPr>
+                                <m:e>
+                                  <m:r>
+                                    <m:rPr>
+                                      <m:sty m:val="p"/>
+                                    </m:rPr>
+                                    <a:rPr lang="en-US" sz="2000" b="0" i="0" smtClean="0">
+                                      <a:latin typeface="Cambria Math" panose="02040503050406030204" pitchFamily="18" charset="0"/>
+                                    </a:rPr>
+                                    <m:t>Ω</m:t>
+                                  </m:r>
+                                </m:e>
+                                <m:sub>
+                                  <m:r>
+                                    <a:rPr lang="en-US" sz="2000" b="0" i="1" smtClean="0">
+                                      <a:latin typeface="Cambria Math" panose="02040503050406030204" pitchFamily="18" charset="0"/>
+                                    </a:rPr>
+                                    <m:t>0</m:t>
+                                  </m:r>
+                                </m:sub>
+                              </m:sSub>
+                              <m:r>
+                                <a:rPr lang="en-US" sz="2000" b="0" i="1" smtClean="0">
+                                  <a:latin typeface="Cambria Math" panose="02040503050406030204" pitchFamily="18" charset="0"/>
+                                </a:rPr>
+                                <m:t>𝑡</m:t>
+                              </m:r>
+                              <m:r>
+                                <a:rPr lang="en-US" sz="2000" b="0" i="1" smtClean="0">
+                                  <a:latin typeface="Cambria Math" panose="02040503050406030204" pitchFamily="18" charset="0"/>
+                                </a:rPr>
+                                <m:t>+</m:t>
+                              </m:r>
+                              <m:f>
+                                <m:fPr>
+                                  <m:ctrlPr>
+                                    <a:rPr lang="en-US" sz="2000" b="0" i="1" smtClean="0">
+                                      <a:latin typeface="Cambria Math" panose="02040503050406030204" pitchFamily="18" charset="0"/>
+                                    </a:rPr>
+                                  </m:ctrlPr>
+                                </m:fPr>
+                                <m:num>
+                                  <m:r>
+                                    <a:rPr lang="en-US" sz="2000" b="0" i="1" smtClean="0">
+                                      <a:latin typeface="Cambria Math" panose="02040503050406030204" pitchFamily="18" charset="0"/>
+                                    </a:rPr>
+                                    <m:t> </m:t>
+                                  </m:r>
+                                  <m:r>
+                                    <a:rPr lang="en-US" sz="2000" b="0" i="1" smtClean="0">
+                                      <a:latin typeface="Cambria Math" panose="02040503050406030204" pitchFamily="18" charset="0"/>
+                                    </a:rPr>
+                                    <m:t>𝜋</m:t>
+                                  </m:r>
+                                </m:num>
+                                <m:den>
+                                  <m:r>
+                                    <a:rPr lang="en-US" sz="2000" b="0" i="1" smtClean="0">
+                                      <a:latin typeface="Cambria Math" panose="02040503050406030204" pitchFamily="18" charset="0"/>
+                                    </a:rPr>
+                                    <m:t>3</m:t>
+                                  </m:r>
+                                </m:den>
+                              </m:f>
+                            </m:e>
+                          </m:d>
+                        </m:e>
+                      </m:func>
+                      <m:r>
+                        <a:rPr lang="en-US" sz="2000" b="0" i="1" smtClean="0">
+                          <a:latin typeface="Cambria Math" panose="02040503050406030204" pitchFamily="18" charset="0"/>
+                        </a:rPr>
+                        <m:t>+4</m:t>
+                      </m:r>
+                      <m:func>
+                        <m:funcPr>
+                          <m:ctrlPr>
+                            <a:rPr lang="en-US" sz="2000" b="0" i="1" smtClean="0">
+                              <a:latin typeface="Cambria Math" panose="02040503050406030204" pitchFamily="18" charset="0"/>
+                            </a:rPr>
+                          </m:ctrlPr>
+                        </m:funcPr>
+                        <m:fName>
+                          <m:r>
+                            <m:rPr>
+                              <m:sty m:val="p"/>
+                            </m:rPr>
+                            <a:rPr lang="en-US" sz="2000" b="0" i="0" smtClean="0">
+                              <a:latin typeface="Cambria Math" panose="02040503050406030204" pitchFamily="18" charset="0"/>
+                            </a:rPr>
+                            <m:t>sin</m:t>
+                          </m:r>
+                        </m:fName>
+                        <m:e>
+                          <m:d>
+                            <m:dPr>
+                              <m:ctrlPr>
+                                <a:rPr lang="en-US" sz="2000" b="0" i="1" smtClean="0">
+                                  <a:latin typeface="Cambria Math" panose="02040503050406030204" pitchFamily="18" charset="0"/>
+                                </a:rPr>
+                              </m:ctrlPr>
+                            </m:dPr>
+                            <m:e>
+                              <m:r>
+                                <a:rPr lang="en-US" sz="2000" b="0" i="1" smtClean="0">
+                                  <a:latin typeface="Cambria Math" panose="02040503050406030204" pitchFamily="18" charset="0"/>
+                                </a:rPr>
+                                <m:t>3</m:t>
+                              </m:r>
+                              <m:sSub>
+                                <m:sSubPr>
+                                  <m:ctrlPr>
+                                    <a:rPr lang="en-US" sz="2000" b="0" i="1" smtClean="0">
+                                      <a:latin typeface="Cambria Math" panose="02040503050406030204" pitchFamily="18" charset="0"/>
+                                    </a:rPr>
+                                  </m:ctrlPr>
+                                </m:sSubPr>
+                                <m:e>
+                                  <m:r>
+                                    <m:rPr>
+                                      <m:sty m:val="p"/>
+                                    </m:rPr>
+                                    <a:rPr lang="en-US" sz="2000" b="0" i="0" smtClean="0">
+                                      <a:latin typeface="Cambria Math" panose="02040503050406030204" pitchFamily="18" charset="0"/>
+                                    </a:rPr>
+                                    <m:t>Ω</m:t>
+                                  </m:r>
+                                </m:e>
+                                <m:sub>
+                                  <m:r>
+                                    <a:rPr lang="en-US" sz="2000" b="0" i="1" smtClean="0">
+                                      <a:latin typeface="Cambria Math" panose="02040503050406030204" pitchFamily="18" charset="0"/>
+                                    </a:rPr>
+                                    <m:t>0</m:t>
+                                  </m:r>
+                                </m:sub>
+                              </m:sSub>
+                              <m:r>
+                                <a:rPr lang="en-US" sz="2000" b="0" i="1" smtClean="0">
+                                  <a:latin typeface="Cambria Math" panose="02040503050406030204" pitchFamily="18" charset="0"/>
+                                </a:rPr>
+                                <m:t>𝑡</m:t>
+                              </m:r>
+                            </m:e>
+                          </m:d>
+                        </m:e>
+                      </m:func>
+                      <m:r>
+                        <a:rPr lang="en-US" sz="2000" b="0" i="1" smtClean="0">
+                          <a:latin typeface="Cambria Math" panose="02040503050406030204" pitchFamily="18" charset="0"/>
+                        </a:rPr>
+                        <m:t> </m:t>
+                      </m:r>
+                    </m:oMath>
+                  </m:oMathPara>
+                </a14:m>
+                <a:endParaRPr lang="en-US" sz="2000" dirty="0" smtClean="0"/>
+              </a:p>
+              <a:p>
+                <a:pPr marL="457200" lvl="1" indent="0">
+                  <a:buNone/>
+                </a:pPr>
+                <a:endParaRPr lang="en-US" sz="1600" dirty="0" smtClean="0"/>
+              </a:p>
+              <a:p>
+                <a:pPr marL="0" indent="0">
+                  <a:buNone/>
+                </a:pPr>
+                <a:r>
+                  <a:rPr lang="en-US" sz="2000" dirty="0" smtClean="0"/>
+                  <a:t>	4b) What is the Fourier Transform of a periodic Square,</a:t>
+                </a:r>
+              </a:p>
+              <a:p>
+                <a:pPr marL="914400" lvl="2" indent="0">
+                  <a:buNone/>
+                </a:pPr>
+                <a:endParaRPr lang="en-US" sz="1400" dirty="0" smtClean="0"/>
+              </a:p>
+              <a:p>
+                <a:pPr marL="457200" indent="-457200">
+                  <a:buAutoNum type="arabicParenR" startAt="5"/>
+                </a:pPr>
+                <a:r>
+                  <a:rPr lang="en-US" sz="2000" dirty="0" smtClean="0"/>
+                  <a:t>How to calculate the Fourier coefficients</a:t>
+                </a:r>
+              </a:p>
+              <a:p>
+                <a:pPr marL="457200" indent="-457200">
+                  <a:buAutoNum type="arabicParenR" startAt="5"/>
+                </a:pPr>
+                <a:r>
+                  <a:rPr lang="en-US" sz="2000" dirty="0" smtClean="0"/>
+                  <a:t>Table of common FS and FT</a:t>
+                </a:r>
+              </a:p>
+              <a:p>
+                <a:pPr lvl="1"/>
+                <a:endParaRPr lang="en-US" sz="1600" dirty="0" smtClean="0"/>
+              </a:p>
+              <a:p>
+                <a:pPr lvl="1"/>
+                <a:endParaRPr lang="en-GB" sz="1600" dirty="0"/>
+              </a:p>
+            </p:txBody>
+          </p:sp>
+        </mc:Choice>
+        <mc:Fallback xmlns="">
+          <p:sp>
+            <p:nvSpPr>
+              <p:cNvPr id="3" name="Content Placeholder 2"/>
+              <p:cNvSpPr>
+                <a:spLocks noGrp="1" noRot="1" noChangeAspect="1" noMove="1" noResize="1" noEditPoints="1" noAdjustHandles="1" noChangeArrowheads="1" noChangeShapeType="1" noTextEdit="1"/>
+              </p:cNvSpPr>
+              <p:nvPr>
+                <p:ph idx="1"/>
+              </p:nvPr>
+            </p:nvSpPr>
+            <p:spPr>
+              <a:xfrm>
+                <a:off x="838200" y="1423844"/>
+                <a:ext cx="10515600" cy="4351338"/>
+              </a:xfrm>
+              <a:blipFill>
+                <a:blip r:embed="rId2"/>
+                <a:stretch>
+                  <a:fillRect l="-638" t="-1543" b="-21038"/>
+                </a:stretch>
+              </a:blipFill>
+            </p:spPr>
+            <p:txBody>
+              <a:bodyPr/>
+              <a:lstStyle/>
+              <a:p>
+                <a:r>
+                  <a:rPr lang="en-GB">
+                    <a:noFill/>
+                  </a:rPr>
+                  <a:t> </a:t>
+                </a:r>
+              </a:p>
+            </p:txBody>
+          </p:sp>
+        </mc:Fallback>
+      </mc:AlternateContent>
+      <p:sp>
+        <p:nvSpPr>
+          <p:cNvPr id="5" name="Slide Number Placeholder 4"/>
+          <p:cNvSpPr>
+            <a:spLocks noGrp="1"/>
+          </p:cNvSpPr>
+          <p:nvPr>
+            <p:ph type="sldNum" sz="quarter" idx="12"/>
+          </p:nvPr>
+        </p:nvSpPr>
         <p:spPr/>
         <p:txBody>
           <a:bodyPr/>
           <a:lstStyle/>
           <a:p>
-            <a:r>
-              <a:rPr lang="en-US" dirty="0" smtClean="0"/>
-              <a:t>Questions we wish to answer</a:t>
-            </a:r>
-            <a:endParaRPr lang="en-GB" dirty="0"/>
-          </a:p>
-        </p:txBody>
-      </p:sp>
-      <p:sp>
-        <p:nvSpPr>
-          <p:cNvPr id="3" name="Content Placeholder 2"/>
-          <p:cNvSpPr>
-            <a:spLocks noGrp="1"/>
-          </p:cNvSpPr>
-          <p:nvPr>
-            <p:ph idx="1"/>
-          </p:nvPr>
-        </p:nvSpPr>
-        <p:spPr/>
-        <p:txBody>
-          <a:bodyPr>
-            <a:normAutofit fontScale="70000" lnSpcReduction="20000"/>
-          </a:bodyPr>
-          <a:lstStyle/>
-          <a:p>
-            <a:pPr marL="0" indent="0">
-              <a:buNone/>
-            </a:pPr>
-            <a:r>
-              <a:rPr lang="en-US" dirty="0" smtClean="0"/>
-              <a:t>1) What is time and frequency representation? Of a signal</a:t>
-            </a:r>
-          </a:p>
-          <a:p>
-            <a:pPr marL="0" indent="0">
-              <a:buNone/>
-            </a:pPr>
-            <a:r>
-              <a:rPr lang="en-US" dirty="0" smtClean="0"/>
-              <a:t>2) What does Fourier Transform do?</a:t>
-            </a:r>
-          </a:p>
-          <a:p>
-            <a:pPr marL="0" indent="0">
-              <a:buNone/>
-            </a:pPr>
-            <a:r>
-              <a:rPr lang="en-US" dirty="0" smtClean="0"/>
-              <a:t>3) How many types of Fourier Transform?</a:t>
-            </a:r>
-          </a:p>
-          <a:p>
-            <a:pPr marL="0" indent="0">
-              <a:buNone/>
-            </a:pPr>
-            <a:endParaRPr lang="en-US" dirty="0" smtClean="0"/>
-          </a:p>
-          <a:p>
-            <a:pPr marL="0" indent="0">
-              <a:buNone/>
-            </a:pPr>
-            <a:r>
-              <a:rPr lang="en-US" dirty="0" smtClean="0"/>
-              <a:t>4) What is the representation of </a:t>
-            </a:r>
-          </a:p>
-          <a:p>
-            <a:pPr lvl="1"/>
-            <a:r>
-              <a:rPr lang="en-US" dirty="0" smtClean="0"/>
-              <a:t>y1(t) = </a:t>
-            </a:r>
-            <a:r>
-              <a:rPr lang="en-US" dirty="0" err="1" smtClean="0"/>
-              <a:t>Acos</a:t>
-            </a:r>
-            <a:r>
-              <a:rPr lang="en-US" dirty="0" smtClean="0"/>
-              <a:t>(2\</a:t>
-            </a:r>
-            <a:r>
-              <a:rPr lang="en-US" dirty="0" err="1" smtClean="0"/>
-              <a:t>piFt</a:t>
-            </a:r>
-            <a:r>
-              <a:rPr lang="en-US" dirty="0" smtClean="0"/>
-              <a:t>)</a:t>
-            </a:r>
-          </a:p>
-          <a:p>
-            <a:pPr lvl="1"/>
-            <a:r>
-              <a:rPr lang="en-US" dirty="0" smtClean="0"/>
-              <a:t>y1a(t) = </a:t>
-            </a:r>
-            <a:r>
-              <a:rPr lang="en-US" dirty="0" err="1" smtClean="0"/>
-              <a:t>Acos</a:t>
-            </a:r>
-            <a:r>
-              <a:rPr lang="en-US" dirty="0" smtClean="0"/>
-              <a:t>(2\</a:t>
-            </a:r>
-            <a:r>
-              <a:rPr lang="en-US" dirty="0" err="1" smtClean="0"/>
-              <a:t>piFt</a:t>
-            </a:r>
-            <a:r>
-              <a:rPr lang="en-US" dirty="0" smtClean="0"/>
-              <a:t> + theta1) </a:t>
-            </a:r>
-          </a:p>
-          <a:p>
-            <a:pPr lvl="1"/>
-            <a:r>
-              <a:rPr lang="en-US" dirty="0" smtClean="0"/>
-              <a:t>y2(t) = </a:t>
-            </a:r>
-            <a:r>
-              <a:rPr lang="en-US" dirty="0" err="1" smtClean="0"/>
-              <a:t>Asin</a:t>
-            </a:r>
-            <a:r>
-              <a:rPr lang="en-US" dirty="0" smtClean="0"/>
-              <a:t>(2\</a:t>
-            </a:r>
-            <a:r>
-              <a:rPr lang="en-US" dirty="0" err="1" smtClean="0"/>
-              <a:t>piFt</a:t>
-            </a:r>
-            <a:r>
-              <a:rPr lang="en-US" dirty="0" smtClean="0"/>
-              <a:t>) </a:t>
-            </a:r>
-          </a:p>
-          <a:p>
-            <a:pPr lvl="1"/>
-            <a:r>
-              <a:rPr lang="en-US" dirty="0" smtClean="0"/>
-              <a:t>y2a(t) = </a:t>
-            </a:r>
-            <a:r>
-              <a:rPr lang="en-US" dirty="0" err="1" smtClean="0"/>
-              <a:t>Asin</a:t>
-            </a:r>
-            <a:r>
-              <a:rPr lang="en-US" dirty="0" smtClean="0"/>
-              <a:t>(2\</a:t>
-            </a:r>
-            <a:r>
-              <a:rPr lang="en-US" dirty="0" err="1" smtClean="0"/>
-              <a:t>piFt</a:t>
-            </a:r>
-            <a:r>
-              <a:rPr lang="en-US" dirty="0" smtClean="0"/>
-              <a:t> + theta2</a:t>
-            </a:r>
-          </a:p>
-          <a:p>
-            <a:pPr marL="457200" lvl="1" indent="0">
-              <a:buNone/>
-            </a:pPr>
-            <a:endParaRPr lang="en-US" dirty="0"/>
-          </a:p>
-          <a:p>
-            <a:pPr marL="0" indent="0">
-              <a:buNone/>
-            </a:pPr>
-            <a:r>
-              <a:rPr lang="en-US" dirty="0" smtClean="0"/>
-              <a:t>5) What is the Fourier Transform of a periodic Square,</a:t>
-            </a:r>
-          </a:p>
-          <a:p>
-            <a:pPr lvl="2"/>
-            <a:r>
-              <a:rPr lang="en-US" dirty="0" err="1" smtClean="0"/>
-              <a:t>Letr</a:t>
-            </a:r>
-            <a:r>
-              <a:rPr lang="en-US" dirty="0" smtClean="0"/>
-              <a:t> visualize the </a:t>
-            </a:r>
-            <a:r>
-              <a:rPr lang="en-US" dirty="0" err="1" smtClean="0"/>
-              <a:t>perioic</a:t>
-            </a:r>
-            <a:r>
-              <a:rPr lang="en-US" dirty="0" smtClean="0"/>
-              <a:t> square as more terms are added.</a:t>
-            </a:r>
-          </a:p>
-          <a:p>
-            <a:pPr marL="914400" lvl="2" indent="0">
-              <a:buNone/>
-            </a:pPr>
-            <a:endParaRPr lang="en-US" dirty="0" smtClean="0"/>
-          </a:p>
-          <a:p>
-            <a:pPr marL="0" indent="0">
-              <a:buNone/>
-            </a:pPr>
-            <a:r>
-              <a:rPr lang="en-US" dirty="0" smtClean="0"/>
-              <a:t>6) How to calculate the Fourier coefficients</a:t>
-            </a:r>
-          </a:p>
-          <a:p>
-            <a:pPr marL="0" indent="0">
-              <a:buNone/>
-            </a:pPr>
-            <a:r>
-              <a:rPr lang="en-US" dirty="0"/>
-              <a:t>	</a:t>
-            </a:r>
-            <a:r>
-              <a:rPr lang="en-US" dirty="0" smtClean="0"/>
-              <a:t>- Table of common FS and FT</a:t>
-            </a:r>
-          </a:p>
-          <a:p>
-            <a:pPr lvl="1"/>
-            <a:endParaRPr lang="en-US" dirty="0" smtClean="0"/>
-          </a:p>
-          <a:p>
-            <a:pPr lvl="1"/>
-            <a:endParaRPr lang="en-GB" dirty="0"/>
+            <a:fld id="{10F1DA42-9B2A-4636-961F-FFD9F81D915F}" type="slidenum">
+              <a:rPr lang="en-GB" smtClean="0"/>
+              <a:t>2</a:t>
+            </a:fld>
+            <a:endParaRPr lang="en-GB"/>
           </a:p>
         </p:txBody>
       </p:sp>
@@ -3339,32 +4155,83 @@
         </p:nvSpPr>
         <p:spPr>
           <a:xfrm>
-            <a:off x="340895" y="0"/>
-            <a:ext cx="10515600" cy="1325563"/>
+            <a:off x="34636" y="268143"/>
+            <a:ext cx="4080164" cy="1325563"/>
           </a:xfrm>
         </p:spPr>
         <p:txBody>
+          <a:bodyPr>
+            <a:normAutofit fontScale="90000"/>
+          </a:bodyPr>
+          <a:lstStyle/>
+          <a:p>
+            <a:r>
+              <a:rPr lang="en-US" dirty="0" smtClean="0"/>
+              <a:t>3) Types of Fourier Transform</a:t>
+            </a:r>
+            <a:endParaRPr lang="en-GB" dirty="0"/>
+          </a:p>
+        </p:txBody>
+      </p:sp>
+      <p:pic>
+        <p:nvPicPr>
+          <p:cNvPr id="5" name="Content Placeholder 4"/>
+          <p:cNvPicPr>
+            <a:picLocks noGrp="1" noChangeAspect="1"/>
+          </p:cNvPicPr>
+          <p:nvPr>
+            <p:ph idx="1"/>
+          </p:nvPr>
+        </p:nvPicPr>
+        <p:blipFill>
+          <a:blip r:embed="rId3"/>
+          <a:stretch>
+            <a:fillRect/>
+          </a:stretch>
+        </p:blipFill>
+        <p:spPr>
+          <a:xfrm>
+            <a:off x="4505073" y="399899"/>
+            <a:ext cx="7686927" cy="6321576"/>
+          </a:xfrm>
+          <a:prstGeom prst="rect">
+            <a:avLst/>
+          </a:prstGeom>
+        </p:spPr>
+      </p:pic>
+      <p:sp>
+        <p:nvSpPr>
+          <p:cNvPr id="4" name="Slide Number Placeholder 3"/>
+          <p:cNvSpPr>
+            <a:spLocks noGrp="1"/>
+          </p:cNvSpPr>
+          <p:nvPr>
+            <p:ph type="sldNum" sz="quarter" idx="12"/>
+          </p:nvPr>
+        </p:nvSpPr>
+        <p:spPr/>
+        <p:txBody>
           <a:bodyPr/>
           <a:lstStyle/>
           <a:p>
-            <a:r>
-              <a:rPr lang="en-US" dirty="0" smtClean="0"/>
-              <a:t>Various CT FS representations</a:t>
-            </a:r>
-            <a:endParaRPr lang="en-GB" dirty="0"/>
-          </a:p>
-        </p:txBody>
-      </p:sp>
-      <p:sp>
-        <p:nvSpPr>
-          <p:cNvPr id="5" name="TextBox 4"/>
+            <a:fld id="{10F1DA42-9B2A-4636-961F-FFD9F81D915F}" type="slidenum">
+              <a:rPr lang="en-GB" smtClean="0"/>
+              <a:t>3</a:t>
+            </a:fld>
+            <a:endParaRPr lang="en-GB"/>
+          </a:p>
+        </p:txBody>
+      </p:sp>
+      <p:sp>
+        <p:nvSpPr>
+          <p:cNvPr id="6" name="TextBox 5"/>
           <p:cNvSpPr txBox="1"/>
           <p:nvPr/>
         </p:nvSpPr>
         <p:spPr>
           <a:xfrm>
-            <a:off x="540327" y="6414655"/>
-            <a:ext cx="6747360" cy="369332"/>
+            <a:off x="128276" y="4602024"/>
+            <a:ext cx="2276136" cy="1477328"/>
           </a:xfrm>
           <a:prstGeom prst="rect">
             <a:avLst/>
@@ -3378,53 +4245,751 @@
           <a:lstStyle/>
           <a:p>
             <a:r>
-              <a:rPr lang="en-US" dirty="0" err="1" smtClean="0"/>
-              <a:t>Pg</a:t>
-            </a:r>
-            <a:r>
               <a:rPr lang="en-US" dirty="0" smtClean="0"/>
-              <a:t> 158, 4</a:t>
-            </a:r>
-            <a:r>
-              <a:rPr lang="en-US" baseline="30000" dirty="0" smtClean="0"/>
-              <a:t>th</a:t>
-            </a:r>
+              <a:t>Legend: </a:t>
+            </a:r>
+          </a:p>
+          <a:p>
             <a:r>
               <a:rPr lang="en-US" dirty="0" smtClean="0"/>
-              <a:t> edition, “Signals System and Transform” by Philips and Parr</a:t>
-            </a:r>
-            <a:endParaRPr lang="en-GB" dirty="0"/>
-          </a:p>
-        </p:txBody>
-      </p:sp>
-      <p:pic>
-        <p:nvPicPr>
-          <p:cNvPr id="6" name="Picture 5"/>
-          <p:cNvPicPr>
-            <a:picLocks noChangeAspect="1"/>
-          </p:cNvPicPr>
+              <a:t>CT = continuous Time,</a:t>
+            </a:r>
+          </a:p>
+          <a:p>
+            <a:r>
+              <a:rPr lang="en-US" dirty="0" smtClean="0"/>
+              <a:t>DT = discrete Time</a:t>
+            </a:r>
+          </a:p>
+          <a:p>
+            <a:r>
+              <a:rPr lang="en-US" dirty="0" smtClean="0"/>
+              <a:t>FT = Fourier transform</a:t>
+            </a:r>
+          </a:p>
+          <a:p>
+            <a:r>
+              <a:rPr lang="en-US" dirty="0" smtClean="0"/>
+              <a:t>FS = Fourier Series</a:t>
+            </a:r>
+          </a:p>
+        </p:txBody>
+      </p:sp>
+      <p:graphicFrame>
+        <p:nvGraphicFramePr>
+          <p:cNvPr id="11" name="Table 10"/>
+          <p:cNvGraphicFramePr>
+            <a:graphicFrameLocks noGrp="1"/>
+          </p:cNvGraphicFramePr>
+          <p:nvPr>
+            <p:extLst>
+              <p:ext uri="{D42A27DB-BD31-4B8C-83A1-F6EECF244321}">
+                <p14:modId xmlns:p14="http://schemas.microsoft.com/office/powerpoint/2010/main" val="244731009"/>
+              </p:ext>
+            </p:extLst>
+          </p:nvPr>
+        </p:nvGraphicFramePr>
+        <p:xfrm>
+          <a:off x="34636" y="1896195"/>
+          <a:ext cx="4914423" cy="2494280"/>
+        </p:xfrm>
+        <a:graphic>
+          <a:graphicData uri="http://schemas.openxmlformats.org/drawingml/2006/table">
+            <a:tbl>
+              <a:tblPr firstRow="1" bandRow="1">
+                <a:tableStyleId>{5C22544A-7EE6-4342-B048-85BDC9FD1C3A}</a:tableStyleId>
+              </a:tblPr>
+              <a:tblGrid>
+                <a:gridCol w="665595">
+                  <a:extLst>
+                    <a:ext uri="{9D8B030D-6E8A-4147-A177-3AD203B41FA5}">
+                      <a16:colId xmlns:a16="http://schemas.microsoft.com/office/drawing/2014/main" val="3459655670"/>
+                    </a:ext>
+                  </a:extLst>
+                </a:gridCol>
+                <a:gridCol w="1779733">
+                  <a:extLst>
+                    <a:ext uri="{9D8B030D-6E8A-4147-A177-3AD203B41FA5}">
+                      <a16:colId xmlns:a16="http://schemas.microsoft.com/office/drawing/2014/main" val="4216359048"/>
+                    </a:ext>
+                  </a:extLst>
+                </a:gridCol>
+                <a:gridCol w="2469095">
+                  <a:extLst>
+                    <a:ext uri="{9D8B030D-6E8A-4147-A177-3AD203B41FA5}">
+                      <a16:colId xmlns:a16="http://schemas.microsoft.com/office/drawing/2014/main" val="1477152512"/>
+                    </a:ext>
+                  </a:extLst>
+                </a:gridCol>
+              </a:tblGrid>
+              <a:tr h="370840">
+                <a:tc>
+                  <a:txBody>
+                    <a:bodyPr/>
+                    <a:lstStyle/>
+                    <a:p>
+                      <a:r>
+                        <a:rPr lang="en-US" dirty="0" smtClean="0"/>
+                        <a:t>S/N</a:t>
+                      </a:r>
+                      <a:endParaRPr lang="en-GB" dirty="0"/>
+                    </a:p>
+                  </a:txBody>
+                  <a:tcPr/>
+                </a:tc>
+                <a:tc>
+                  <a:txBody>
+                    <a:bodyPr/>
+                    <a:lstStyle/>
+                    <a:p>
+                      <a:r>
+                        <a:rPr lang="en-US" dirty="0" smtClean="0"/>
+                        <a:t>Input</a:t>
+                      </a:r>
+                      <a:r>
+                        <a:rPr lang="en-US" baseline="0" dirty="0" smtClean="0"/>
+                        <a:t> Signal</a:t>
+                      </a:r>
+                      <a:endParaRPr lang="en-GB" dirty="0"/>
+                    </a:p>
+                  </a:txBody>
+                  <a:tcPr/>
+                </a:tc>
+                <a:tc>
+                  <a:txBody>
+                    <a:bodyPr/>
+                    <a:lstStyle/>
+                    <a:p>
+                      <a:r>
+                        <a:rPr lang="en-US" dirty="0" smtClean="0"/>
+                        <a:t>Types of Fourier Transform</a:t>
+                      </a:r>
+                      <a:endParaRPr lang="en-GB" dirty="0"/>
+                    </a:p>
+                  </a:txBody>
+                  <a:tcPr/>
+                </a:tc>
+                <a:extLst>
+                  <a:ext uri="{0D108BD9-81ED-4DB2-BD59-A6C34878D82A}">
+                    <a16:rowId xmlns:a16="http://schemas.microsoft.com/office/drawing/2014/main" val="2823324141"/>
+                  </a:ext>
+                </a:extLst>
+              </a:tr>
+              <a:tr h="370840">
+                <a:tc>
+                  <a:txBody>
+                    <a:bodyPr/>
+                    <a:lstStyle/>
+                    <a:p>
+                      <a:r>
+                        <a:rPr lang="en-US" dirty="0" smtClean="0"/>
+                        <a:t>A</a:t>
+                      </a:r>
+                      <a:endParaRPr lang="en-GB" dirty="0"/>
+                    </a:p>
+                  </a:txBody>
+                  <a:tcPr/>
+                </a:tc>
+                <a:tc>
+                  <a:txBody>
+                    <a:bodyPr/>
+                    <a:lstStyle/>
+                    <a:p>
+                      <a:r>
+                        <a:rPr lang="en-US" dirty="0" err="1" smtClean="0"/>
+                        <a:t>CT+aperiodic</a:t>
+                      </a:r>
+                      <a:endParaRPr lang="en-GB" dirty="0"/>
+                    </a:p>
+                  </a:txBody>
+                  <a:tcPr/>
+                </a:tc>
+                <a:tc>
+                  <a:txBody>
+                    <a:bodyPr/>
+                    <a:lstStyle/>
+                    <a:p>
+                      <a:r>
+                        <a:rPr lang="en-US" dirty="0" smtClean="0"/>
+                        <a:t>CTFT</a:t>
+                      </a:r>
+                      <a:endParaRPr lang="en-GB" dirty="0"/>
+                    </a:p>
+                  </a:txBody>
+                  <a:tcPr/>
+                </a:tc>
+                <a:extLst>
+                  <a:ext uri="{0D108BD9-81ED-4DB2-BD59-A6C34878D82A}">
+                    <a16:rowId xmlns:a16="http://schemas.microsoft.com/office/drawing/2014/main" val="60285895"/>
+                  </a:ext>
+                </a:extLst>
+              </a:tr>
+              <a:tr h="370840">
+                <a:tc>
+                  <a:txBody>
+                    <a:bodyPr/>
+                    <a:lstStyle/>
+                    <a:p>
+                      <a:r>
+                        <a:rPr lang="en-US" dirty="0" smtClean="0"/>
+                        <a:t>B</a:t>
+                      </a:r>
+                      <a:endParaRPr lang="en-GB" dirty="0"/>
+                    </a:p>
+                  </a:txBody>
+                  <a:tcPr/>
+                </a:tc>
+                <a:tc>
+                  <a:txBody>
+                    <a:bodyPr/>
+                    <a:lstStyle/>
+                    <a:p>
+                      <a:r>
+                        <a:rPr lang="en-US" dirty="0" err="1" smtClean="0"/>
+                        <a:t>CT+periodic</a:t>
+                      </a:r>
+                      <a:endParaRPr lang="en-GB" dirty="0"/>
+                    </a:p>
+                  </a:txBody>
+                  <a:tcPr/>
+                </a:tc>
+                <a:tc>
+                  <a:txBody>
+                    <a:bodyPr/>
+                    <a:lstStyle/>
+                    <a:p>
+                      <a:r>
+                        <a:rPr lang="en-US" dirty="0" smtClean="0"/>
+                        <a:t>CTFS, CTFT</a:t>
+                      </a:r>
+                      <a:endParaRPr lang="en-GB" dirty="0"/>
+                    </a:p>
+                  </a:txBody>
+                  <a:tcPr/>
+                </a:tc>
+                <a:extLst>
+                  <a:ext uri="{0D108BD9-81ED-4DB2-BD59-A6C34878D82A}">
+                    <a16:rowId xmlns:a16="http://schemas.microsoft.com/office/drawing/2014/main" val="3545652328"/>
+                  </a:ext>
+                </a:extLst>
+              </a:tr>
+              <a:tr h="370840">
+                <a:tc>
+                  <a:txBody>
+                    <a:bodyPr/>
+                    <a:lstStyle/>
+                    <a:p>
+                      <a:r>
+                        <a:rPr lang="en-US" dirty="0" smtClean="0"/>
+                        <a:t>C</a:t>
+                      </a:r>
+                      <a:endParaRPr lang="en-GB" dirty="0"/>
+                    </a:p>
+                  </a:txBody>
+                  <a:tcPr/>
+                </a:tc>
+                <a:tc>
+                  <a:txBody>
+                    <a:bodyPr/>
+                    <a:lstStyle/>
+                    <a:p>
+                      <a:r>
+                        <a:rPr lang="en-US" dirty="0" err="1" smtClean="0"/>
+                        <a:t>DT+aperiodic</a:t>
+                      </a:r>
+                      <a:endParaRPr lang="en-GB" dirty="0"/>
+                    </a:p>
+                  </a:txBody>
+                  <a:tcPr/>
+                </a:tc>
+                <a:tc>
+                  <a:txBody>
+                    <a:bodyPr/>
+                    <a:lstStyle/>
+                    <a:p>
+                      <a:r>
+                        <a:rPr lang="en-US" dirty="0" smtClean="0"/>
+                        <a:t>DTFT</a:t>
+                      </a:r>
+                      <a:endParaRPr lang="en-GB" dirty="0"/>
+                    </a:p>
+                  </a:txBody>
+                  <a:tcPr/>
+                </a:tc>
+                <a:extLst>
+                  <a:ext uri="{0D108BD9-81ED-4DB2-BD59-A6C34878D82A}">
+                    <a16:rowId xmlns:a16="http://schemas.microsoft.com/office/drawing/2014/main" val="3684124652"/>
+                  </a:ext>
+                </a:extLst>
+              </a:tr>
+              <a:tr h="370840">
+                <a:tc>
+                  <a:txBody>
+                    <a:bodyPr/>
+                    <a:lstStyle/>
+                    <a:p>
+                      <a:r>
+                        <a:rPr lang="en-US" dirty="0" smtClean="0"/>
+                        <a:t>D</a:t>
+                      </a:r>
+                      <a:endParaRPr lang="en-GB" dirty="0"/>
+                    </a:p>
+                  </a:txBody>
+                  <a:tcPr/>
+                </a:tc>
+                <a:tc>
+                  <a:txBody>
+                    <a:bodyPr/>
+                    <a:lstStyle/>
+                    <a:p>
+                      <a:r>
+                        <a:rPr lang="en-US" dirty="0" err="1" smtClean="0"/>
+                        <a:t>DT+periodic</a:t>
+                      </a:r>
+                      <a:endParaRPr lang="en-GB" dirty="0"/>
+                    </a:p>
+                  </a:txBody>
+                  <a:tcPr/>
+                </a:tc>
+                <a:tc>
+                  <a:txBody>
+                    <a:bodyPr/>
+                    <a:lstStyle/>
+                    <a:p>
+                      <a:r>
+                        <a:rPr lang="en-US" dirty="0" smtClean="0"/>
+                        <a:t>DTFS,</a:t>
+                      </a:r>
+                      <a:r>
+                        <a:rPr lang="en-US" baseline="0" dirty="0" smtClean="0"/>
+                        <a:t> DTFT</a:t>
+                      </a:r>
+                      <a:endParaRPr lang="en-GB" dirty="0"/>
+                    </a:p>
+                  </a:txBody>
+                  <a:tcPr/>
+                </a:tc>
+                <a:extLst>
+                  <a:ext uri="{0D108BD9-81ED-4DB2-BD59-A6C34878D82A}">
+                    <a16:rowId xmlns:a16="http://schemas.microsoft.com/office/drawing/2014/main" val="1153181086"/>
+                  </a:ext>
+                </a:extLst>
+              </a:tr>
+              <a:tr h="370840">
+                <a:tc gridSpan="3">
+                  <a:txBody>
+                    <a:bodyPr/>
+                    <a:lstStyle/>
+                    <a:p>
+                      <a:endParaRPr lang="en-GB" dirty="0"/>
+                    </a:p>
+                  </a:txBody>
+                  <a:tcPr/>
+                </a:tc>
+                <a:tc hMerge="1">
+                  <a:txBody>
+                    <a:bodyPr/>
+                    <a:lstStyle/>
+                    <a:p>
+                      <a:endParaRPr lang="en-GB" dirty="0"/>
+                    </a:p>
+                  </a:txBody>
+                  <a:tcPr/>
+                </a:tc>
+                <a:tc hMerge="1">
+                  <a:txBody>
+                    <a:bodyPr/>
+                    <a:lstStyle/>
+                    <a:p>
+                      <a:endParaRPr lang="en-GB" dirty="0"/>
+                    </a:p>
+                  </a:txBody>
+                  <a:tcPr/>
+                </a:tc>
+                <a:extLst>
+                  <a:ext uri="{0D108BD9-81ED-4DB2-BD59-A6C34878D82A}">
+                    <a16:rowId xmlns:a16="http://schemas.microsoft.com/office/drawing/2014/main" val="2324912080"/>
+                  </a:ext>
+                </a:extLst>
+              </a:tr>
+            </a:tbl>
+          </a:graphicData>
+        </a:graphic>
+      </p:graphicFrame>
+      <p:sp>
+        <p:nvSpPr>
+          <p:cNvPr id="16" name="Rectangle 15"/>
+          <p:cNvSpPr/>
           <p:nvPr/>
-        </p:nvPicPr>
-        <p:blipFill>
-          <a:blip r:embed="rId2"/>
-          <a:stretch>
-            <a:fillRect/>
-          </a:stretch>
-        </p:blipFill>
+        </p:nvSpPr>
         <p:spPr>
           <a:xfrm>
-            <a:off x="720437" y="1690688"/>
-            <a:ext cx="8751754" cy="4554862"/>
+            <a:off x="8054127" y="2085975"/>
+            <a:ext cx="858982" cy="742950"/>
           </a:xfrm>
           <a:prstGeom prst="rect">
             <a:avLst/>
           </a:prstGeom>
         </p:spPr>
-      </p:pic>
+        <p:style>
+          <a:lnRef idx="2">
+            <a:schemeClr val="accent1">
+              <a:shade val="50000"/>
+            </a:schemeClr>
+          </a:lnRef>
+          <a:fillRef idx="1">
+            <a:schemeClr val="accent1"/>
+          </a:fillRef>
+          <a:effectRef idx="0">
+            <a:schemeClr val="accent1"/>
+          </a:effectRef>
+          <a:fontRef idx="minor">
+            <a:schemeClr val="lt1"/>
+          </a:fontRef>
+        </p:style>
+        <p:txBody>
+          <a:bodyPr rtlCol="0" anchor="ctr"/>
+          <a:lstStyle/>
+          <a:p>
+            <a:pPr algn="ctr"/>
+            <a:r>
+              <a:rPr lang="en-US" sz="1600" dirty="0" smtClean="0">
+                <a:ln w="0"/>
+                <a:solidFill>
+                  <a:schemeClr val="tx1"/>
+                </a:solidFill>
+                <a:effectLst>
+                  <a:outerShdw blurRad="38100" dist="19050" dir="2700000" algn="tl" rotWithShape="0">
+                    <a:schemeClr val="dk1">
+                      <a:alpha val="40000"/>
+                    </a:schemeClr>
+                  </a:outerShdw>
+                </a:effectLst>
+              </a:rPr>
+              <a:t>CTFT </a:t>
+            </a:r>
+            <a:br>
+              <a:rPr lang="en-US" sz="1600" dirty="0" smtClean="0">
+                <a:ln w="0"/>
+                <a:solidFill>
+                  <a:schemeClr val="tx1"/>
+                </a:solidFill>
+                <a:effectLst>
+                  <a:outerShdw blurRad="38100" dist="19050" dir="2700000" algn="tl" rotWithShape="0">
+                    <a:schemeClr val="dk1">
+                      <a:alpha val="40000"/>
+                    </a:schemeClr>
+                  </a:outerShdw>
+                </a:effectLst>
+              </a:rPr>
+            </a:br>
+            <a:r>
+              <a:rPr lang="en-US" sz="1600" dirty="0" smtClean="0">
+                <a:ln w="0"/>
+                <a:solidFill>
+                  <a:schemeClr val="tx1"/>
+                </a:solidFill>
+                <a:effectLst>
+                  <a:outerShdw blurRad="38100" dist="19050" dir="2700000" algn="tl" rotWithShape="0">
+                    <a:schemeClr val="dk1">
+                      <a:alpha val="40000"/>
+                    </a:schemeClr>
+                  </a:outerShdw>
+                </a:effectLst>
+              </a:rPr>
+              <a:t>and CTFS</a:t>
+            </a:r>
+            <a:endParaRPr lang="en-GB" sz="1600" dirty="0">
+              <a:ln w="0"/>
+              <a:solidFill>
+                <a:schemeClr val="tx1"/>
+              </a:solidFill>
+              <a:effectLst>
+                <a:outerShdw blurRad="38100" dist="19050" dir="2700000" algn="tl" rotWithShape="0">
+                  <a:schemeClr val="dk1">
+                    <a:alpha val="40000"/>
+                  </a:schemeClr>
+                </a:outerShdw>
+              </a:effectLst>
+            </a:endParaRPr>
+          </a:p>
+        </p:txBody>
+      </p:sp>
+      <p:cxnSp>
+        <p:nvCxnSpPr>
+          <p:cNvPr id="15" name="Straight Arrow Connector 14"/>
+          <p:cNvCxnSpPr/>
+          <p:nvPr/>
+        </p:nvCxnSpPr>
+        <p:spPr>
+          <a:xfrm>
+            <a:off x="8663727" y="5805435"/>
+            <a:ext cx="498764" cy="0"/>
+          </a:xfrm>
+          <a:prstGeom prst="straightConnector1">
+            <a:avLst/>
+          </a:prstGeom>
+          <a:ln w="57150">
+            <a:solidFill>
+              <a:schemeClr val="tx1"/>
+            </a:solidFill>
+            <a:tailEnd type="triangle"/>
+          </a:ln>
+        </p:spPr>
+        <p:style>
+          <a:lnRef idx="1">
+            <a:schemeClr val="accent1"/>
+          </a:lnRef>
+          <a:fillRef idx="0">
+            <a:schemeClr val="accent1"/>
+          </a:fillRef>
+          <a:effectRef idx="0">
+            <a:schemeClr val="accent1"/>
+          </a:effectRef>
+          <a:fontRef idx="minor">
+            <a:schemeClr val="tx1"/>
+          </a:fontRef>
+        </p:style>
+      </p:cxnSp>
+      <p:sp>
+        <p:nvSpPr>
+          <p:cNvPr id="17" name="Rectangle 16"/>
+          <p:cNvSpPr/>
+          <p:nvPr/>
+        </p:nvSpPr>
+        <p:spPr>
+          <a:xfrm>
+            <a:off x="7919045" y="1083610"/>
+            <a:ext cx="858982" cy="318654"/>
+          </a:xfrm>
+          <a:prstGeom prst="rect">
+            <a:avLst/>
+          </a:prstGeom>
+        </p:spPr>
+        <p:style>
+          <a:lnRef idx="2">
+            <a:schemeClr val="accent1">
+              <a:shade val="50000"/>
+            </a:schemeClr>
+          </a:lnRef>
+          <a:fillRef idx="1">
+            <a:schemeClr val="accent1"/>
+          </a:fillRef>
+          <a:effectRef idx="0">
+            <a:schemeClr val="accent1"/>
+          </a:effectRef>
+          <a:fontRef idx="minor">
+            <a:schemeClr val="lt1"/>
+          </a:fontRef>
+        </p:style>
+        <p:txBody>
+          <a:bodyPr rtlCol="0" anchor="ctr"/>
+          <a:lstStyle/>
+          <a:p>
+            <a:pPr algn="ctr"/>
+            <a:r>
+              <a:rPr lang="en-US" sz="1600" dirty="0" smtClean="0">
+                <a:ln w="0"/>
+                <a:solidFill>
+                  <a:schemeClr val="tx1"/>
+                </a:solidFill>
+                <a:effectLst>
+                  <a:outerShdw blurRad="38100" dist="19050" dir="2700000" algn="tl" rotWithShape="0">
+                    <a:schemeClr val="dk1">
+                      <a:alpha val="40000"/>
+                    </a:schemeClr>
+                  </a:outerShdw>
+                </a:effectLst>
+              </a:rPr>
+              <a:t>CTFT</a:t>
+            </a:r>
+            <a:endParaRPr lang="en-GB" sz="1600" dirty="0">
+              <a:ln w="0"/>
+              <a:solidFill>
+                <a:schemeClr val="tx1"/>
+              </a:solidFill>
+              <a:effectLst>
+                <a:outerShdw blurRad="38100" dist="19050" dir="2700000" algn="tl" rotWithShape="0">
+                  <a:schemeClr val="dk1">
+                    <a:alpha val="40000"/>
+                  </a:schemeClr>
+                </a:outerShdw>
+              </a:effectLst>
+            </a:endParaRPr>
+          </a:p>
+        </p:txBody>
+      </p:sp>
+      <p:sp>
+        <p:nvSpPr>
+          <p:cNvPr id="18" name="Rectangle 17"/>
+          <p:cNvSpPr/>
+          <p:nvPr/>
+        </p:nvSpPr>
+        <p:spPr>
+          <a:xfrm>
+            <a:off x="7624636" y="3743215"/>
+            <a:ext cx="858982" cy="318654"/>
+          </a:xfrm>
+          <a:prstGeom prst="rect">
+            <a:avLst/>
+          </a:prstGeom>
+        </p:spPr>
+        <p:style>
+          <a:lnRef idx="2">
+            <a:schemeClr val="accent1">
+              <a:shade val="50000"/>
+            </a:schemeClr>
+          </a:lnRef>
+          <a:fillRef idx="1">
+            <a:schemeClr val="accent1"/>
+          </a:fillRef>
+          <a:effectRef idx="0">
+            <a:schemeClr val="accent1"/>
+          </a:effectRef>
+          <a:fontRef idx="minor">
+            <a:schemeClr val="lt1"/>
+          </a:fontRef>
+        </p:style>
+        <p:txBody>
+          <a:bodyPr rtlCol="0" anchor="ctr"/>
+          <a:lstStyle/>
+          <a:p>
+            <a:pPr algn="ctr"/>
+            <a:r>
+              <a:rPr lang="en-US" sz="1600" dirty="0" smtClean="0">
+                <a:ln w="0"/>
+                <a:solidFill>
+                  <a:schemeClr val="tx1"/>
+                </a:solidFill>
+                <a:effectLst>
+                  <a:outerShdw blurRad="38100" dist="19050" dir="2700000" algn="tl" rotWithShape="0">
+                    <a:schemeClr val="dk1">
+                      <a:alpha val="40000"/>
+                    </a:schemeClr>
+                  </a:outerShdw>
+                </a:effectLst>
+              </a:rPr>
+              <a:t>DTFT</a:t>
+            </a:r>
+            <a:endParaRPr lang="en-GB" sz="1600" dirty="0">
+              <a:ln w="0"/>
+              <a:solidFill>
+                <a:schemeClr val="tx1"/>
+              </a:solidFill>
+              <a:effectLst>
+                <a:outerShdw blurRad="38100" dist="19050" dir="2700000" algn="tl" rotWithShape="0">
+                  <a:schemeClr val="dk1">
+                    <a:alpha val="40000"/>
+                  </a:schemeClr>
+                </a:outerShdw>
+              </a:effectLst>
+            </a:endParaRPr>
+          </a:p>
+        </p:txBody>
+      </p:sp>
+      <p:sp>
+        <p:nvSpPr>
+          <p:cNvPr id="12" name="Rectangle 11"/>
+          <p:cNvSpPr/>
+          <p:nvPr/>
+        </p:nvSpPr>
+        <p:spPr>
+          <a:xfrm>
+            <a:off x="7985973" y="5441414"/>
+            <a:ext cx="858982" cy="745074"/>
+          </a:xfrm>
+          <a:prstGeom prst="rect">
+            <a:avLst/>
+          </a:prstGeom>
+        </p:spPr>
+        <p:style>
+          <a:lnRef idx="2">
+            <a:schemeClr val="accent1">
+              <a:shade val="50000"/>
+            </a:schemeClr>
+          </a:lnRef>
+          <a:fillRef idx="1">
+            <a:schemeClr val="accent1"/>
+          </a:fillRef>
+          <a:effectRef idx="0">
+            <a:schemeClr val="accent1"/>
+          </a:effectRef>
+          <a:fontRef idx="minor">
+            <a:schemeClr val="lt1"/>
+          </a:fontRef>
+        </p:style>
+        <p:txBody>
+          <a:bodyPr rtlCol="0" anchor="ctr"/>
+          <a:lstStyle/>
+          <a:p>
+            <a:pPr algn="ctr"/>
+            <a:r>
+              <a:rPr lang="en-US" dirty="0" smtClean="0">
+                <a:ln w="0"/>
+                <a:solidFill>
+                  <a:schemeClr val="tx1"/>
+                </a:solidFill>
+                <a:effectLst>
+                  <a:outerShdw blurRad="38100" dist="19050" dir="2700000" algn="tl" rotWithShape="0">
+                    <a:schemeClr val="dk1">
+                      <a:alpha val="40000"/>
+                    </a:schemeClr>
+                  </a:outerShdw>
+                </a:effectLst>
+              </a:rPr>
+              <a:t>DTFT</a:t>
+            </a:r>
+            <a:br>
+              <a:rPr lang="en-US" dirty="0" smtClean="0">
+                <a:ln w="0"/>
+                <a:solidFill>
+                  <a:schemeClr val="tx1"/>
+                </a:solidFill>
+                <a:effectLst>
+                  <a:outerShdw blurRad="38100" dist="19050" dir="2700000" algn="tl" rotWithShape="0">
+                    <a:schemeClr val="dk1">
+                      <a:alpha val="40000"/>
+                    </a:schemeClr>
+                  </a:outerShdw>
+                </a:effectLst>
+              </a:rPr>
+            </a:br>
+            <a:r>
+              <a:rPr lang="en-US" dirty="0" smtClean="0">
+                <a:ln w="0"/>
+                <a:solidFill>
+                  <a:schemeClr val="tx1"/>
+                </a:solidFill>
+                <a:effectLst>
+                  <a:outerShdw blurRad="38100" dist="19050" dir="2700000" algn="tl" rotWithShape="0">
+                    <a:schemeClr val="dk1">
+                      <a:alpha val="40000"/>
+                    </a:schemeClr>
+                  </a:outerShdw>
+                </a:effectLst>
+              </a:rPr>
+              <a:t>and DTFS</a:t>
+            </a:r>
+            <a:endParaRPr lang="en-GB" dirty="0">
+              <a:ln w="0"/>
+              <a:solidFill>
+                <a:schemeClr val="tx1"/>
+              </a:solidFill>
+              <a:effectLst>
+                <a:outerShdw blurRad="38100" dist="19050" dir="2700000" algn="tl" rotWithShape="0">
+                  <a:schemeClr val="dk1">
+                    <a:alpha val="40000"/>
+                  </a:schemeClr>
+                </a:outerShdw>
+              </a:effectLst>
+            </a:endParaRPr>
+          </a:p>
+        </p:txBody>
+      </p:sp>
     </p:spTree>
     <p:extLst>
       <p:ext uri="{BB962C8B-B14F-4D97-AF65-F5344CB8AC3E}">
-        <p14:creationId xmlns:p14="http://schemas.microsoft.com/office/powerpoint/2010/main" val="2941119829"/>
+        <p14:creationId xmlns:p14="http://schemas.microsoft.com/office/powerpoint/2010/main" val="700041243"/>
       </p:ext>
     </p:extLst>
   </p:cSld>
@@ -3463,6 +5028,170 @@
         </p:nvSpPr>
         <p:spPr>
           <a:xfrm>
+            <a:off x="340895" y="0"/>
+            <a:ext cx="10515600" cy="1325563"/>
+          </a:xfrm>
+        </p:spPr>
+        <p:txBody>
+          <a:bodyPr>
+            <a:normAutofit fontScale="90000"/>
+          </a:bodyPr>
+          <a:lstStyle/>
+          <a:p>
+            <a:r>
+              <a:rPr lang="en-US" dirty="0" smtClean="0"/>
+              <a:t>3A) </a:t>
+            </a:r>
+            <a:r>
+              <a:rPr lang="en-US" smtClean="0"/>
+              <a:t>Various CTFS</a:t>
+            </a:r>
+            <a:br>
+              <a:rPr lang="en-US" smtClean="0"/>
+            </a:br>
+            <a:r>
+              <a:rPr lang="en-US" smtClean="0"/>
+              <a:t>Continuous </a:t>
+            </a:r>
+            <a:r>
+              <a:rPr lang="en-US" dirty="0" smtClean="0"/>
+              <a:t>Time Fourier Series Representations</a:t>
+            </a:r>
+            <a:endParaRPr lang="en-GB" dirty="0"/>
+          </a:p>
+        </p:txBody>
+      </p:sp>
+      <p:sp>
+        <p:nvSpPr>
+          <p:cNvPr id="5" name="TextBox 4"/>
+          <p:cNvSpPr txBox="1"/>
+          <p:nvPr/>
+        </p:nvSpPr>
+        <p:spPr>
+          <a:xfrm>
+            <a:off x="540327" y="6414655"/>
+            <a:ext cx="6747360" cy="369332"/>
+          </a:xfrm>
+          <a:prstGeom prst="rect">
+            <a:avLst/>
+          </a:prstGeom>
+          <a:noFill/>
+        </p:spPr>
+        <p:txBody>
+          <a:bodyPr wrap="none" rtlCol="0">
+            <a:spAutoFit/>
+          </a:bodyPr>
+          <a:lstStyle/>
+          <a:p>
+            <a:r>
+              <a:rPr lang="en-US" dirty="0" err="1" smtClean="0"/>
+              <a:t>Pg</a:t>
+            </a:r>
+            <a:r>
+              <a:rPr lang="en-US" dirty="0" smtClean="0"/>
+              <a:t> 158, 4</a:t>
+            </a:r>
+            <a:r>
+              <a:rPr lang="en-US" baseline="30000" dirty="0" smtClean="0"/>
+              <a:t>th</a:t>
+            </a:r>
+            <a:r>
+              <a:rPr lang="en-US" dirty="0" smtClean="0"/>
+              <a:t> edition, “Signals System and Transform” by Philips and Parr</a:t>
+            </a:r>
+            <a:endParaRPr lang="en-GB" dirty="0"/>
+          </a:p>
+        </p:txBody>
+      </p:sp>
+      <p:pic>
+        <p:nvPicPr>
+          <p:cNvPr id="6" name="Picture 5"/>
+          <p:cNvPicPr>
+            <a:picLocks noChangeAspect="1"/>
+          </p:cNvPicPr>
+          <p:nvPr/>
+        </p:nvPicPr>
+        <p:blipFill>
+          <a:blip r:embed="rId2"/>
+          <a:stretch>
+            <a:fillRect/>
+          </a:stretch>
+        </p:blipFill>
+        <p:spPr>
+          <a:xfrm>
+            <a:off x="692727" y="1325563"/>
+            <a:ext cx="8751754" cy="4554862"/>
+          </a:xfrm>
+          <a:prstGeom prst="rect">
+            <a:avLst/>
+          </a:prstGeom>
+        </p:spPr>
+      </p:pic>
+      <p:sp>
+        <p:nvSpPr>
+          <p:cNvPr id="3" name="Slide Number Placeholder 2"/>
+          <p:cNvSpPr>
+            <a:spLocks noGrp="1"/>
+          </p:cNvSpPr>
+          <p:nvPr>
+            <p:ph type="sldNum" sz="quarter" idx="12"/>
+          </p:nvPr>
+        </p:nvSpPr>
+        <p:spPr/>
+        <p:txBody>
+          <a:bodyPr/>
+          <a:lstStyle/>
+          <a:p>
+            <a:fld id="{10F1DA42-9B2A-4636-961F-FFD9F81D915F}" type="slidenum">
+              <a:rPr lang="en-GB" smtClean="0"/>
+              <a:t>4</a:t>
+            </a:fld>
+            <a:endParaRPr lang="en-GB"/>
+          </a:p>
+        </p:txBody>
+      </p:sp>
+    </p:spTree>
+    <p:extLst>
+      <p:ext uri="{BB962C8B-B14F-4D97-AF65-F5344CB8AC3E}">
+        <p14:creationId xmlns:p14="http://schemas.microsoft.com/office/powerpoint/2010/main" val="2941119829"/>
+      </p:ext>
+    </p:extLst>
+  </p:cSld>
+  <p:clrMapOvr>
+    <a:masterClrMapping/>
+  </p:clrMapOvr>
+</p:sld>
+</file>
+
+<file path=ppt/slides/slide5.xml><?xml version="1.0" encoding="utf-8"?>
+<p:sld xmlns:a="http://schemas.openxmlformats.org/drawingml/2006/main" xmlns:r="http://schemas.openxmlformats.org/officeDocument/2006/relationships" xmlns:p="http://schemas.openxmlformats.org/presentationml/2006/main">
+  <p:cSld>
+    <p:spTree>
+      <p:nvGrpSpPr>
+        <p:cNvPr id="1" name=""/>
+        <p:cNvGrpSpPr/>
+        <p:nvPr/>
+      </p:nvGrpSpPr>
+      <p:grpSpPr>
+        <a:xfrm>
+          <a:off x="0" y="0"/>
+          <a:ext cx="0" cy="0"/>
+          <a:chOff x="0" y="0"/>
+          <a:chExt cx="0" cy="0"/>
+        </a:xfrm>
+      </p:grpSpPr>
+      <p:sp>
+        <p:nvSpPr>
+          <p:cNvPr id="2" name="Title 1"/>
+          <p:cNvSpPr>
+            <a:spLocks noGrp="1"/>
+          </p:cNvSpPr>
+          <p:nvPr>
+            <p:ph type="title"/>
+          </p:nvPr>
+        </p:nvSpPr>
+        <p:spPr>
+          <a:xfrm>
             <a:off x="284018" y="1"/>
             <a:ext cx="11250256" cy="1027906"/>
           </a:xfrm>
@@ -3475,24 +5204,28 @@
           <a:p>
             <a:r>
               <a:rPr lang="en-US" dirty="0" smtClean="0"/>
+              <a:t>4a) </a:t>
+            </a:r>
+            <a:r>
+              <a:rPr lang="en-US" sz="3600" dirty="0" smtClean="0"/>
               <a:t>Introduction to CTFS – example from sum of sinusoids</a:t>
             </a:r>
             <a:br>
-              <a:rPr lang="en-US" dirty="0" smtClean="0"/>
+              <a:rPr lang="en-US" sz="3600" dirty="0" smtClean="0"/>
             </a:br>
             <a:r>
-              <a:rPr lang="en-US" dirty="0" smtClean="0"/>
+              <a:rPr lang="en-US" sz="3600" dirty="0" smtClean="0"/>
               <a:t>Example: Philips and Parr : </a:t>
             </a:r>
             <a:r>
-              <a:rPr lang="en-US" dirty="0" err="1" smtClean="0"/>
+              <a:rPr lang="en-US" sz="3600" dirty="0" err="1" smtClean="0"/>
               <a:t>pg</a:t>
             </a:r>
             <a:r>
-              <a:rPr lang="en-US" dirty="0" smtClean="0"/>
+              <a:rPr lang="en-US" sz="3600" dirty="0" smtClean="0"/>
               <a:t> 156</a:t>
             </a:r>
-            <a:endParaRPr lang="en-GB" dirty="0"/>
+            <a:endParaRPr lang="en-GB" sz="3600" dirty="0"/>
           </a:p>
         </p:txBody>
       </p:sp>
@@ -3546,239 +5279,33 @@
           </a:prstGeom>
         </p:spPr>
       </p:pic>
+      <p:sp>
+        <p:nvSpPr>
+          <p:cNvPr id="3" name="Slide Number Placeholder 2"/>
+          <p:cNvSpPr>
+            <a:spLocks noGrp="1"/>
+          </p:cNvSpPr>
+          <p:nvPr>
+            <p:ph type="sldNum" sz="quarter" idx="12"/>
+          </p:nvPr>
+        </p:nvSpPr>
+        <p:spPr/>
+        <p:txBody>
+          <a:bodyPr/>
+          <a:lstStyle/>
+          <a:p>
+            <a:fld id="{10F1DA42-9B2A-4636-961F-FFD9F81D915F}" type="slidenum">
+              <a:rPr lang="en-GB" smtClean="0"/>
+              <a:t>5</a:t>
+            </a:fld>
+            <a:endParaRPr lang="en-GB"/>
+          </a:p>
+        </p:txBody>
+      </p:sp>
     </p:spTree>
     <p:extLst>
       <p:ext uri="{BB962C8B-B14F-4D97-AF65-F5344CB8AC3E}">
         <p14:creationId xmlns:p14="http://schemas.microsoft.com/office/powerpoint/2010/main" val="910798931"/>
-      </p:ext>
-    </p:extLst>
-  </p:cSld>
-  <p:clrMapOvr>
-    <a:masterClrMapping/>
-  </p:clrMapOvr>
-</p:sld>
-</file>
-
-<file path=ppt/slides/slide5.xml><?xml version="1.0" encoding="utf-8"?>
-<p:sld xmlns:a="http://schemas.openxmlformats.org/drawingml/2006/main" xmlns:r="http://schemas.openxmlformats.org/officeDocument/2006/relationships" xmlns:p="http://schemas.openxmlformats.org/presentationml/2006/main">
-  <p:cSld>
-    <p:spTree>
-      <p:nvGrpSpPr>
-        <p:cNvPr id="1" name=""/>
-        <p:cNvGrpSpPr/>
-        <p:nvPr/>
-      </p:nvGrpSpPr>
-      <p:grpSpPr>
-        <a:xfrm>
-          <a:off x="0" y="0"/>
-          <a:ext cx="0" cy="0"/>
-          <a:chOff x="0" y="0"/>
-          <a:chExt cx="0" cy="0"/>
-        </a:xfrm>
-      </p:grpSpPr>
-      <p:sp>
-        <p:nvSpPr>
-          <p:cNvPr id="2" name="Title 1"/>
-          <p:cNvSpPr>
-            <a:spLocks noGrp="1"/>
-          </p:cNvSpPr>
-          <p:nvPr>
-            <p:ph type="title"/>
-          </p:nvPr>
-        </p:nvSpPr>
-        <p:spPr/>
-        <p:txBody>
-          <a:bodyPr/>
-          <a:lstStyle/>
-          <a:p>
-            <a:r>
-              <a:rPr lang="en-US" dirty="0" smtClean="0"/>
-              <a:t>Some great references</a:t>
-            </a:r>
-            <a:br>
-              <a:rPr lang="en-US" dirty="0" smtClean="0"/>
-            </a:br>
-            <a:r>
-              <a:rPr lang="en-US" dirty="0" smtClean="0"/>
-              <a:t>Worked Example:</a:t>
-            </a:r>
-            <a:endParaRPr lang="en-GB" dirty="0"/>
-          </a:p>
-        </p:txBody>
-      </p:sp>
-      <p:sp>
-        <p:nvSpPr>
-          <p:cNvPr id="3" name="Content Placeholder 2"/>
-          <p:cNvSpPr>
-            <a:spLocks noGrp="1"/>
-          </p:cNvSpPr>
-          <p:nvPr>
-            <p:ph idx="1"/>
-          </p:nvPr>
-        </p:nvSpPr>
-        <p:spPr>
-          <a:xfrm>
-            <a:off x="838200" y="3532909"/>
-            <a:ext cx="10515600" cy="2644054"/>
-          </a:xfrm>
-        </p:spPr>
-        <p:txBody>
-          <a:bodyPr>
-            <a:normAutofit fontScale="85000" lnSpcReduction="20000"/>
-          </a:bodyPr>
-          <a:lstStyle/>
-          <a:p>
-            <a:pPr marL="514350" indent="-514350">
-              <a:buAutoNum type="arabicParenR"/>
-            </a:pPr>
-            <a:r>
-              <a:rPr lang="en-US" u="sng" dirty="0" smtClean="0">
-                <a:hlinkClick r:id="rId2"/>
-              </a:rPr>
-              <a:t>Michael van </a:t>
-            </a:r>
-            <a:r>
-              <a:rPr lang="en-US" u="sng" dirty="0" err="1" smtClean="0">
-                <a:hlinkClick r:id="rId2"/>
-              </a:rPr>
-              <a:t>Biezen</a:t>
-            </a:r>
-            <a:r>
-              <a:rPr lang="en-US" u="sng" dirty="0" smtClean="0">
-                <a:hlinkClick r:id="rId2"/>
-              </a:rPr>
-              <a:t> – </a:t>
-            </a:r>
-            <a:r>
-              <a:rPr lang="en-US" u="sng" dirty="0" err="1" smtClean="0">
-                <a:hlinkClick r:id="rId2"/>
-              </a:rPr>
-              <a:t>youtube</a:t>
-            </a:r>
-            <a:endParaRPr lang="en-US" u="sng" dirty="0" smtClean="0">
-              <a:hlinkClick r:id="rId2"/>
-            </a:endParaRPr>
-          </a:p>
-          <a:p>
-            <a:pPr marL="0" indent="0">
-              <a:buNone/>
-            </a:pPr>
-            <a:r>
-              <a:rPr lang="en-US" dirty="0"/>
-              <a:t>Electrical Engineering: </a:t>
-            </a:r>
-            <a:r>
-              <a:rPr lang="en-US" dirty="0" err="1"/>
-              <a:t>Ch</a:t>
-            </a:r>
-            <a:r>
-              <a:rPr lang="en-US" dirty="0"/>
-              <a:t> 18: Fourier Series (1 of 35) What is a Fourier Series?</a:t>
-            </a:r>
-          </a:p>
-          <a:p>
-            <a:pPr marL="514350" indent="-514350">
-              <a:buAutoNum type="arabicParenR"/>
-            </a:pPr>
-            <a:endParaRPr lang="en-GB" u="sng" dirty="0">
-              <a:hlinkClick r:id="rId2"/>
-            </a:endParaRPr>
-          </a:p>
-          <a:p>
-            <a:pPr marL="0" indent="0">
-              <a:buNone/>
-            </a:pPr>
-            <a:r>
-              <a:rPr lang="en-GB" dirty="0" smtClean="0">
-                <a:hlinkClick r:id="rId2"/>
-              </a:rPr>
-              <a:t>https</a:t>
-            </a:r>
-            <a:r>
-              <a:rPr lang="en-GB" dirty="0">
-                <a:hlinkClick r:id="rId2"/>
-              </a:rPr>
-              <a:t>://</a:t>
-            </a:r>
-            <a:r>
-              <a:rPr lang="en-GB" dirty="0" smtClean="0">
-                <a:hlinkClick r:id="rId2"/>
-              </a:rPr>
-              <a:t>www.youtube.com/watch?v=28oKg7GMbvI&amp;list=PLX2gX-ftPVXVScC8Hz8nmcZTAMXTluTIn</a:t>
-            </a:r>
-            <a:endParaRPr lang="en-GB" dirty="0" smtClean="0"/>
-          </a:p>
-          <a:p>
-            <a:pPr marL="0" indent="0">
-              <a:buNone/>
-            </a:pPr>
-            <a:endParaRPr lang="en-GB" dirty="0" smtClean="0">
-              <a:hlinkClick r:id="rId3"/>
-            </a:endParaRPr>
-          </a:p>
-          <a:p>
-            <a:pPr marL="0" indent="0">
-              <a:buNone/>
-            </a:pPr>
-            <a:r>
-              <a:rPr lang="en-GB" dirty="0" smtClean="0">
-                <a:hlinkClick r:id="rId3"/>
-              </a:rPr>
-              <a:t>http</a:t>
-            </a:r>
-            <a:r>
-              <a:rPr lang="en-GB" dirty="0">
-                <a:hlinkClick r:id="rId3"/>
-              </a:rPr>
-              <a:t>://www.ilectureonline.com/search/fourier</a:t>
-            </a:r>
-            <a:r>
-              <a:rPr lang="en-GB" dirty="0" smtClean="0">
-                <a:hlinkClick r:id="rId3"/>
-              </a:rPr>
-              <a:t>#</a:t>
-            </a:r>
-            <a:endParaRPr lang="en-GB" dirty="0" smtClean="0"/>
-          </a:p>
-          <a:p>
-            <a:pPr marL="0" indent="0">
-              <a:buNone/>
-            </a:pPr>
-            <a:endParaRPr lang="en-GB" dirty="0" smtClean="0"/>
-          </a:p>
-          <a:p>
-            <a:endParaRPr lang="en-GB" dirty="0"/>
-          </a:p>
-        </p:txBody>
-      </p:sp>
-      <p:pic>
-        <p:nvPicPr>
-          <p:cNvPr id="4" name="Picture 3"/>
-          <p:cNvPicPr>
-            <a:picLocks noChangeAspect="1"/>
-          </p:cNvPicPr>
-          <p:nvPr/>
-        </p:nvPicPr>
-        <p:blipFill>
-          <a:blip r:embed="rId4"/>
-          <a:stretch>
-            <a:fillRect/>
-          </a:stretch>
-        </p:blipFill>
-        <p:spPr>
-          <a:xfrm>
-            <a:off x="7233280" y="96982"/>
-            <a:ext cx="4120520" cy="3732164"/>
-          </a:xfrm>
-          <a:prstGeom prst="rect">
-            <a:avLst/>
-          </a:prstGeom>
-        </p:spPr>
-      </p:pic>
-    </p:spTree>
-    <p:extLst>
-      <p:ext uri="{BB962C8B-B14F-4D97-AF65-F5344CB8AC3E}">
-        <p14:creationId xmlns:p14="http://schemas.microsoft.com/office/powerpoint/2010/main" val="1015599197"/>
       </p:ext>
     </p:extLst>
   </p:cSld>
@@ -3817,63 +5344,43 @@
         </p:nvSpPr>
         <p:spPr>
           <a:xfrm>
-            <a:off x="85725" y="107583"/>
-            <a:ext cx="10134600" cy="635367"/>
+            <a:off x="173422" y="0"/>
+            <a:ext cx="10515600" cy="1325563"/>
           </a:xfrm>
         </p:spPr>
         <p:txBody>
-          <a:bodyPr>
-            <a:normAutofit fontScale="90000"/>
-          </a:bodyPr>
+          <a:bodyPr/>
           <a:lstStyle/>
           <a:p>
             <a:r>
               <a:rPr lang="en-US" dirty="0" smtClean="0"/>
-              <a:t/>
-            </a:r>
-            <a:br>
+              <a:t>4a) My </a:t>
+            </a:r>
+            <a:r>
+              <a:rPr lang="en-US" dirty="0" err="1" smtClean="0"/>
+              <a:t>Matlab</a:t>
+            </a:r>
+            <a:r>
               <a:rPr lang="en-US" dirty="0" smtClean="0"/>
-            </a:br>
-            <a:r>
-              <a:rPr lang="en-US" dirty="0" smtClean="0"/>
-              <a:t/>
-            </a:r>
-            <a:br>
-              <a:rPr lang="en-US" dirty="0" smtClean="0"/>
-            </a:br>
-            <a:r>
-              <a:rPr lang="en-US" dirty="0"/>
-              <a:t>Common FS of periodic CT signals </a:t>
-            </a:r>
-            <a:r>
-              <a:rPr lang="en-US" dirty="0" smtClean="0"/>
-              <a:t/>
-            </a:r>
-            <a:br>
-              <a:rPr lang="en-US" dirty="0" smtClean="0"/>
-            </a:br>
+              <a:t> Code </a:t>
+            </a:r>
             <a:r>
               <a:rPr lang="en-US" dirty="0" err="1" smtClean="0"/>
-              <a:t>Pg</a:t>
-            </a:r>
-            <a:r>
-              <a:rPr lang="en-US" dirty="0" smtClean="0"/>
-              <a:t> 168, Philips and Parr</a:t>
-            </a:r>
-            <a:br>
-              <a:rPr lang="en-US" dirty="0" smtClean="0"/>
-            </a:br>
+              <a:t>Expt</a:t>
+            </a:r>
             <a:endParaRPr lang="en-GB" dirty="0"/>
           </a:p>
         </p:txBody>
       </p:sp>
       <p:pic>
         <p:nvPicPr>
-          <p:cNvPr id="5" name="Picture 4"/>
+          <p:cNvPr id="4" name="Content Placeholder 3"/>
           <p:cNvPicPr>
-            <a:picLocks noChangeAspect="1"/>
+            <a:picLocks noGrp="1" noChangeAspect="1"/>
           </p:cNvPicPr>
-          <p:nvPr/>
+          <p:nvPr>
+            <p:ph idx="1"/>
+          </p:nvPr>
         </p:nvPicPr>
         <p:blipFill>
           <a:blip r:embed="rId2"/>
@@ -3883,48 +5390,116 @@
         </p:blipFill>
         <p:spPr>
           <a:xfrm>
-            <a:off x="6461455" y="2105879"/>
-            <a:ext cx="5592000" cy="3438095"/>
+            <a:off x="0" y="1301820"/>
+            <a:ext cx="6109374" cy="4351338"/>
           </a:xfrm>
           <a:prstGeom prst="rect">
             <a:avLst/>
           </a:prstGeom>
         </p:spPr>
       </p:pic>
-      <p:cxnSp>
-        <p:nvCxnSpPr>
-          <p:cNvPr id="7" name="Straight Connector 6"/>
-          <p:cNvCxnSpPr/>
+      <p:sp>
+        <p:nvSpPr>
+          <p:cNvPr id="6" name="TextBox 5"/>
+          <p:cNvSpPr txBox="1"/>
           <p:nvPr/>
-        </p:nvCxnSpPr>
+        </p:nvSpPr>
         <p:spPr>
           <a:xfrm>
-            <a:off x="6276109" y="1690688"/>
-            <a:ext cx="13855" cy="4446876"/>
+            <a:off x="7017567" y="3241410"/>
+            <a:ext cx="4743671" cy="369332"/>
           </a:xfrm>
-          <a:prstGeom prst="line">
+          <a:prstGeom prst="rect">
             <a:avLst/>
           </a:prstGeom>
-          <a:ln w="53975"/>
+          <a:noFill/>
         </p:spPr>
-        <p:style>
-          <a:lnRef idx="1">
-            <a:schemeClr val="accent1"/>
-          </a:lnRef>
-          <a:fillRef idx="0">
-            <a:schemeClr val="accent1"/>
-          </a:fillRef>
-          <a:effectRef idx="0">
-            <a:schemeClr val="accent1"/>
-          </a:effectRef>
-          <a:fontRef idx="minor">
-            <a:schemeClr val="tx1"/>
-          </a:fontRef>
-        </p:style>
-      </p:cxnSp>
+        <p:txBody>
+          <a:bodyPr wrap="none" rtlCol="0">
+            <a:spAutoFit/>
+          </a:bodyPr>
+          <a:lstStyle/>
+          <a:p>
+            <a:r>
+              <a:rPr lang="en-US" dirty="0" smtClean="0"/>
+              <a:t>Using fundamental frequency F0  = 1/T0  = </a:t>
+            </a:r>
+            <a:r>
+              <a:rPr lang="en-US" dirty="0" smtClean="0"/>
+              <a:t>10 </a:t>
+            </a:r>
+            <a:r>
+              <a:rPr lang="en-US" dirty="0" smtClean="0"/>
+              <a:t>Hz</a:t>
+            </a:r>
+            <a:endParaRPr lang="en-GB" dirty="0"/>
+          </a:p>
+        </p:txBody>
+      </p:sp>
+      <p:sp>
+        <p:nvSpPr>
+          <p:cNvPr id="10" name="TextBox 9"/>
+          <p:cNvSpPr txBox="1"/>
+          <p:nvPr/>
+        </p:nvSpPr>
+        <p:spPr>
+          <a:xfrm>
+            <a:off x="471054" y="6096000"/>
+            <a:ext cx="6358600" cy="369332"/>
+          </a:xfrm>
+          <a:prstGeom prst="rect">
+            <a:avLst/>
+          </a:prstGeom>
+          <a:noFill/>
+        </p:spPr>
+        <p:txBody>
+          <a:bodyPr wrap="none" rtlCol="0">
+            <a:spAutoFit/>
+          </a:bodyPr>
+          <a:lstStyle/>
+          <a:p>
+            <a:r>
+              <a:rPr lang="en-US" dirty="0" err="1" smtClean="0"/>
+              <a:t>Github</a:t>
+            </a:r>
+            <a:r>
+              <a:rPr lang="en-US" dirty="0" smtClean="0"/>
+              <a:t> </a:t>
+            </a:r>
+            <a:r>
+              <a:rPr lang="en-US" dirty="0"/>
+              <a:t>- https://github.com/aseschng/DSP-Matlab-Fourier-Series </a:t>
+            </a:r>
+            <a:endParaRPr lang="en-GB" dirty="0"/>
+          </a:p>
+        </p:txBody>
+      </p:sp>
+      <p:sp>
+        <p:nvSpPr>
+          <p:cNvPr id="3" name="Slide Number Placeholder 2"/>
+          <p:cNvSpPr>
+            <a:spLocks noGrp="1"/>
+          </p:cNvSpPr>
+          <p:nvPr>
+            <p:ph type="sldNum" sz="quarter" idx="12"/>
+          </p:nvPr>
+        </p:nvSpPr>
+        <p:spPr/>
+        <p:txBody>
+          <a:bodyPr/>
+          <a:lstStyle/>
+          <a:p>
+            <a:fld id="{10F1DA42-9B2A-4636-961F-FFD9F81D915F}" type="slidenum">
+              <a:rPr lang="en-GB" smtClean="0"/>
+              <a:t>6</a:t>
+            </a:fld>
+            <a:endParaRPr lang="en-GB"/>
+          </a:p>
+        </p:txBody>
+      </p:sp>
       <p:pic>
         <p:nvPicPr>
-          <p:cNvPr id="8" name="Picture 7"/>
+          <p:cNvPr id="5" name="Picture 4"/>
           <p:cNvPicPr>
             <a:picLocks noChangeAspect="1"/>
           </p:cNvPicPr>
@@ -3938,8 +5513,8 @@
         </p:blipFill>
         <p:spPr>
           <a:xfrm>
-            <a:off x="6461454" y="1800225"/>
-            <a:ext cx="5501945" cy="305654"/>
+            <a:off x="7623293" y="200128"/>
+            <a:ext cx="3743812" cy="3025820"/>
           </a:xfrm>
           <a:prstGeom prst="rect">
             <a:avLst/>
@@ -3948,7 +5523,7 @@
       </p:pic>
       <p:pic>
         <p:nvPicPr>
-          <p:cNvPr id="10" name="Picture 9"/>
+          <p:cNvPr id="7" name="Picture 6"/>
           <p:cNvPicPr>
             <a:picLocks noChangeAspect="1"/>
           </p:cNvPicPr>
@@ -3962,8 +5537,8 @@
         </p:blipFill>
         <p:spPr>
           <a:xfrm>
-            <a:off x="85725" y="1800225"/>
-            <a:ext cx="5877641" cy="4486949"/>
+            <a:off x="7919326" y="3702364"/>
+            <a:ext cx="3447779" cy="2878861"/>
           </a:xfrm>
           <a:prstGeom prst="rect">
             <a:avLst/>
@@ -3973,7 +5548,7 @@
     </p:spTree>
     <p:extLst>
       <p:ext uri="{BB962C8B-B14F-4D97-AF65-F5344CB8AC3E}">
-        <p14:creationId xmlns:p14="http://schemas.microsoft.com/office/powerpoint/2010/main" val="444969330"/>
+        <p14:creationId xmlns:p14="http://schemas.microsoft.com/office/powerpoint/2010/main" val="2094215720"/>
       </p:ext>
     </p:extLst>
   </p:cSld>
@@ -4002,221 +5577,17 @@
       </p:grpSpPr>
       <p:sp>
         <p:nvSpPr>
-          <p:cNvPr id="2" name="Title 1"/>
-          <p:cNvSpPr>
-            <a:spLocks noGrp="1"/>
-          </p:cNvSpPr>
-          <p:nvPr>
-            <p:ph type="title"/>
+          <p:cNvPr id="3" name="Content Placeholder 2"/>
+          <p:cNvSpPr>
+            <a:spLocks noGrp="1"/>
+          </p:cNvSpPr>
+          <p:nvPr>
+            <p:ph idx="1"/>
           </p:nvPr>
         </p:nvSpPr>
         <p:spPr>
           <a:xfrm>
-            <a:off x="173422" y="0"/>
-            <a:ext cx="10515600" cy="1325563"/>
-          </a:xfrm>
-        </p:spPr>
-        <p:txBody>
-          <a:bodyPr/>
-          <a:lstStyle/>
-          <a:p>
-            <a:r>
-              <a:rPr lang="en-US" dirty="0" smtClean="0"/>
-              <a:t>My </a:t>
-            </a:r>
-            <a:r>
-              <a:rPr lang="en-US" dirty="0" err="1" smtClean="0"/>
-              <a:t>Matlab</a:t>
-            </a:r>
-            <a:r>
-              <a:rPr lang="en-US" dirty="0" smtClean="0"/>
-              <a:t> Code - DIY</a:t>
-            </a:r>
-            <a:endParaRPr lang="en-GB" dirty="0"/>
-          </a:p>
-        </p:txBody>
-      </p:sp>
-      <p:pic>
-        <p:nvPicPr>
-          <p:cNvPr id="4" name="Content Placeholder 3"/>
-          <p:cNvPicPr>
-            <a:picLocks noGrp="1" noChangeAspect="1"/>
-          </p:cNvPicPr>
-          <p:nvPr>
-            <p:ph idx="1"/>
-          </p:nvPr>
-        </p:nvPicPr>
-        <p:blipFill>
-          <a:blip r:embed="rId2"/>
-          <a:stretch>
-            <a:fillRect/>
-          </a:stretch>
-        </p:blipFill>
-        <p:spPr>
-          <a:xfrm>
-            <a:off x="0" y="1301820"/>
-            <a:ext cx="6109374" cy="4351338"/>
-          </a:xfrm>
-          <a:prstGeom prst="rect">
-            <a:avLst/>
-          </a:prstGeom>
-        </p:spPr>
-      </p:pic>
-      <p:sp>
-        <p:nvSpPr>
-          <p:cNvPr id="6" name="TextBox 5"/>
-          <p:cNvSpPr txBox="1"/>
-          <p:nvPr/>
-        </p:nvSpPr>
-        <p:spPr>
-          <a:xfrm>
-            <a:off x="6366404" y="3225948"/>
-            <a:ext cx="4977709" cy="369332"/>
-          </a:xfrm>
-          <a:prstGeom prst="rect">
-            <a:avLst/>
-          </a:prstGeom>
-          <a:noFill/>
-        </p:spPr>
-        <p:txBody>
-          <a:bodyPr wrap="none" rtlCol="0">
-            <a:spAutoFit/>
-          </a:bodyPr>
-          <a:lstStyle/>
-          <a:p>
-            <a:r>
-              <a:rPr lang="en-US" dirty="0" smtClean="0"/>
-              <a:t>Using fundamental frequency F0  = 1/T0  = 1000 Hz</a:t>
-            </a:r>
-            <a:endParaRPr lang="en-GB" dirty="0"/>
-          </a:p>
-        </p:txBody>
-      </p:sp>
-      <p:pic>
-        <p:nvPicPr>
-          <p:cNvPr id="8" name="Picture 7"/>
-          <p:cNvPicPr>
-            <a:picLocks noChangeAspect="1"/>
-          </p:cNvPicPr>
-          <p:nvPr/>
-        </p:nvPicPr>
-        <p:blipFill>
-          <a:blip r:embed="rId3"/>
-          <a:stretch>
-            <a:fillRect/>
-          </a:stretch>
-        </p:blipFill>
-        <p:spPr>
-          <a:xfrm>
-            <a:off x="7730836" y="118011"/>
-            <a:ext cx="3954227" cy="3068953"/>
-          </a:xfrm>
-          <a:prstGeom prst="rect">
-            <a:avLst/>
-          </a:prstGeom>
-        </p:spPr>
-      </p:pic>
-      <p:pic>
-        <p:nvPicPr>
-          <p:cNvPr id="9" name="Picture 8"/>
-          <p:cNvPicPr>
-            <a:picLocks noChangeAspect="1"/>
-          </p:cNvPicPr>
-          <p:nvPr/>
-        </p:nvPicPr>
-        <p:blipFill>
-          <a:blip r:embed="rId4"/>
-          <a:stretch>
-            <a:fillRect/>
-          </a:stretch>
-        </p:blipFill>
-        <p:spPr>
-          <a:xfrm>
-            <a:off x="7730836" y="3595280"/>
-            <a:ext cx="3954227" cy="3214255"/>
-          </a:xfrm>
-          <a:prstGeom prst="rect">
-            <a:avLst/>
-          </a:prstGeom>
-        </p:spPr>
-      </p:pic>
-      <p:sp>
-        <p:nvSpPr>
-          <p:cNvPr id="10" name="TextBox 9"/>
-          <p:cNvSpPr txBox="1"/>
-          <p:nvPr/>
-        </p:nvSpPr>
-        <p:spPr>
-          <a:xfrm>
-            <a:off x="484909" y="6096000"/>
-            <a:ext cx="1002197" cy="369332"/>
-          </a:xfrm>
-          <a:prstGeom prst="rect">
-            <a:avLst/>
-          </a:prstGeom>
-          <a:noFill/>
-        </p:spPr>
-        <p:txBody>
-          <a:bodyPr wrap="none" rtlCol="0">
-            <a:spAutoFit/>
-          </a:bodyPr>
-          <a:lstStyle/>
-          <a:p>
-            <a:r>
-              <a:rPr lang="en-US" dirty="0" err="1" smtClean="0"/>
-              <a:t>Github</a:t>
-            </a:r>
-            <a:r>
-              <a:rPr lang="en-US" dirty="0" smtClean="0"/>
-              <a:t> - </a:t>
-            </a:r>
-            <a:endParaRPr lang="en-GB" dirty="0"/>
-          </a:p>
-        </p:txBody>
-      </p:sp>
-    </p:spTree>
-    <p:extLst>
-      <p:ext uri="{BB962C8B-B14F-4D97-AF65-F5344CB8AC3E}">
-        <p14:creationId xmlns:p14="http://schemas.microsoft.com/office/powerpoint/2010/main" val="2845404217"/>
-      </p:ext>
-    </p:extLst>
-  </p:cSld>
-  <p:clrMapOvr>
-    <a:masterClrMapping/>
-  </p:clrMapOvr>
-</p:sld>
-</file>
-
-<file path=ppt/slides/slide8.xml><?xml version="1.0" encoding="utf-8"?>
-<p:sld xmlns:a="http://schemas.openxmlformats.org/drawingml/2006/main" xmlns:r="http://schemas.openxmlformats.org/officeDocument/2006/relationships" xmlns:p="http://schemas.openxmlformats.org/presentationml/2006/main">
-  <p:cSld>
-    <p:spTree>
-      <p:nvGrpSpPr>
-        <p:cNvPr id="1" name=""/>
-        <p:cNvGrpSpPr/>
-        <p:nvPr/>
-      </p:nvGrpSpPr>
-      <p:grpSpPr>
-        <a:xfrm>
-          <a:off x="0" y="0"/>
-          <a:ext cx="0" cy="0"/>
-          <a:chOff x="0" y="0"/>
-          <a:chExt cx="0" cy="0"/>
-        </a:xfrm>
-      </p:grpSpPr>
-      <p:sp>
-        <p:nvSpPr>
-          <p:cNvPr id="3" name="Content Placeholder 2"/>
-          <p:cNvSpPr>
-            <a:spLocks noGrp="1"/>
-          </p:cNvSpPr>
-          <p:nvPr>
-            <p:ph idx="1"/>
-          </p:nvPr>
-        </p:nvSpPr>
-        <p:spPr>
-          <a:xfrm>
-            <a:off x="339436" y="287770"/>
+            <a:off x="339436" y="1371169"/>
             <a:ext cx="3359727" cy="488084"/>
           </a:xfrm>
         </p:spPr>
@@ -4244,7 +5615,7 @@
         </p:nvSpPr>
         <p:spPr>
           <a:xfrm>
-            <a:off x="7114309" y="384752"/>
+            <a:off x="7197436" y="1371169"/>
             <a:ext cx="3359727" cy="488084"/>
           </a:xfrm>
           <a:prstGeom prst="rect">
@@ -4436,9 +5807,72 @@
           </a:p>
         </p:txBody>
       </p:sp>
+      <p:sp>
+        <p:nvSpPr>
+          <p:cNvPr id="2" name="Slide Number Placeholder 1"/>
+          <p:cNvSpPr>
+            <a:spLocks noGrp="1"/>
+          </p:cNvSpPr>
+          <p:nvPr>
+            <p:ph type="sldNum" sz="quarter" idx="12"/>
+          </p:nvPr>
+        </p:nvSpPr>
+        <p:spPr/>
+        <p:txBody>
+          <a:bodyPr/>
+          <a:lstStyle/>
+          <a:p>
+            <a:fld id="{10F1DA42-9B2A-4636-961F-FFD9F81D915F}" type="slidenum">
+              <a:rPr lang="en-GB" smtClean="0"/>
+              <a:t>7</a:t>
+            </a:fld>
+            <a:endParaRPr lang="en-GB"/>
+          </a:p>
+        </p:txBody>
+      </p:sp>
+      <p:sp>
+        <p:nvSpPr>
+          <p:cNvPr id="8" name="Title 1"/>
+          <p:cNvSpPr>
+            <a:spLocks noGrp="1"/>
+          </p:cNvSpPr>
+          <p:nvPr>
+            <p:ph type="title"/>
+          </p:nvPr>
+        </p:nvSpPr>
+        <p:spPr>
+          <a:xfrm>
+            <a:off x="173422" y="0"/>
+            <a:ext cx="10515600" cy="1325563"/>
+          </a:xfrm>
+        </p:spPr>
+        <p:txBody>
+          <a:bodyPr/>
+          <a:lstStyle/>
+          <a:p>
+            <a:r>
+              <a:rPr lang="en-US" dirty="0" smtClean="0"/>
+              <a:t>4a) My </a:t>
+            </a:r>
+            <a:r>
+              <a:rPr lang="en-US" dirty="0" err="1" smtClean="0"/>
+              <a:t>Matlab</a:t>
+            </a:r>
+            <a:r>
+              <a:rPr lang="en-US" dirty="0" smtClean="0"/>
+              <a:t> Code </a:t>
+            </a:r>
+            <a:r>
+              <a:rPr lang="en-US" dirty="0" err="1" smtClean="0"/>
+              <a:t>Expt</a:t>
+            </a:r>
+            <a:endParaRPr lang="en-GB" dirty="0"/>
+          </a:p>
+        </p:txBody>
+      </p:sp>
       <p:pic>
         <p:nvPicPr>
-          <p:cNvPr id="9" name="Picture 8"/>
+          <p:cNvPr id="4" name="Picture 3"/>
           <p:cNvPicPr>
             <a:picLocks noChangeAspect="1"/>
           </p:cNvPicPr>
@@ -4452,8 +5886,207 @@
         </p:blipFill>
         <p:spPr>
           <a:xfrm>
-            <a:off x="6731438" y="872836"/>
-            <a:ext cx="5335859" cy="4419600"/>
+            <a:off x="6526570" y="1859253"/>
+            <a:ext cx="5199713" cy="4292165"/>
+          </a:xfrm>
+          <a:prstGeom prst="rect">
+            <a:avLst/>
+          </a:prstGeom>
+        </p:spPr>
+      </p:pic>
+      <p:pic>
+        <p:nvPicPr>
+          <p:cNvPr id="5" name="Picture 4"/>
+          <p:cNvPicPr>
+            <a:picLocks noChangeAspect="1"/>
+          </p:cNvPicPr>
+          <p:nvPr/>
+        </p:nvPicPr>
+        <p:blipFill>
+          <a:blip r:embed="rId3"/>
+          <a:stretch>
+            <a:fillRect/>
+          </a:stretch>
+        </p:blipFill>
+        <p:spPr>
+          <a:xfrm>
+            <a:off x="339436" y="1904859"/>
+            <a:ext cx="5245823" cy="4343541"/>
+          </a:xfrm>
+          <a:prstGeom prst="rect">
+            <a:avLst/>
+          </a:prstGeom>
+        </p:spPr>
+      </p:pic>
+    </p:spTree>
+    <p:extLst>
+      <p:ext uri="{BB962C8B-B14F-4D97-AF65-F5344CB8AC3E}">
+        <p14:creationId xmlns:p14="http://schemas.microsoft.com/office/powerpoint/2010/main" val="2142694377"/>
+      </p:ext>
+    </p:extLst>
+  </p:cSld>
+  <p:clrMapOvr>
+    <a:masterClrMapping/>
+  </p:clrMapOvr>
+</p:sld>
+</file>
+
+<file path=ppt/slides/slide8.xml><?xml version="1.0" encoding="utf-8"?>
+<p:sld xmlns:a="http://schemas.openxmlformats.org/drawingml/2006/main" xmlns:r="http://schemas.openxmlformats.org/officeDocument/2006/relationships" xmlns:p="http://schemas.openxmlformats.org/presentationml/2006/main">
+  <p:cSld>
+    <p:spTree>
+      <p:nvGrpSpPr>
+        <p:cNvPr id="1" name=""/>
+        <p:cNvGrpSpPr/>
+        <p:nvPr/>
+      </p:nvGrpSpPr>
+      <p:grpSpPr>
+        <a:xfrm>
+          <a:off x="0" y="0"/>
+          <a:ext cx="0" cy="0"/>
+          <a:chOff x="0" y="0"/>
+          <a:chExt cx="0" cy="0"/>
+        </a:xfrm>
+      </p:grpSpPr>
+      <p:sp>
+        <p:nvSpPr>
+          <p:cNvPr id="2" name="Title 1"/>
+          <p:cNvSpPr>
+            <a:spLocks noGrp="1"/>
+          </p:cNvSpPr>
+          <p:nvPr>
+            <p:ph type="title"/>
+          </p:nvPr>
+        </p:nvSpPr>
+        <p:spPr>
+          <a:xfrm>
+            <a:off x="85725" y="107583"/>
+            <a:ext cx="10134600" cy="635367"/>
+          </a:xfrm>
+        </p:spPr>
+        <p:txBody>
+          <a:bodyPr>
+            <a:normAutofit fontScale="90000"/>
+          </a:bodyPr>
+          <a:lstStyle/>
+          <a:p>
+            <a:r>
+              <a:rPr lang="en-US" dirty="0" smtClean="0"/>
+              <a:t/>
+            </a:r>
+            <a:br>
+              <a:rPr lang="en-US" dirty="0" smtClean="0"/>
+            </a:br>
+            <a:r>
+              <a:rPr lang="en-US" dirty="0" smtClean="0"/>
+              <a:t/>
+            </a:r>
+            <a:br>
+              <a:rPr lang="en-US" dirty="0" smtClean="0"/>
+            </a:br>
+            <a:r>
+              <a:rPr lang="en-US" dirty="0" smtClean="0"/>
+              <a:t>6) Common </a:t>
+            </a:r>
+            <a:r>
+              <a:rPr lang="en-US" dirty="0"/>
+              <a:t>FS of periodic CT signals </a:t>
+            </a:r>
+            <a:r>
+              <a:rPr lang="en-US" dirty="0" smtClean="0"/>
+              <a:t/>
+            </a:r>
+            <a:br>
+              <a:rPr lang="en-US" dirty="0" smtClean="0"/>
+            </a:br>
+            <a:r>
+              <a:rPr lang="en-US" dirty="0" err="1" smtClean="0"/>
+              <a:t>Pg</a:t>
+            </a:r>
+            <a:r>
+              <a:rPr lang="en-US" dirty="0" smtClean="0"/>
+              <a:t> 168, Philips and Parr</a:t>
+            </a:r>
+            <a:br>
+              <a:rPr lang="en-US" dirty="0" smtClean="0"/>
+            </a:br>
+            <a:endParaRPr lang="en-GB" dirty="0"/>
+          </a:p>
+        </p:txBody>
+      </p:sp>
+      <p:pic>
+        <p:nvPicPr>
+          <p:cNvPr id="5" name="Picture 4"/>
+          <p:cNvPicPr>
+            <a:picLocks noChangeAspect="1"/>
+          </p:cNvPicPr>
+          <p:nvPr/>
+        </p:nvPicPr>
+        <p:blipFill>
+          <a:blip r:embed="rId2"/>
+          <a:stretch>
+            <a:fillRect/>
+          </a:stretch>
+        </p:blipFill>
+        <p:spPr>
+          <a:xfrm>
+            <a:off x="6461455" y="2105879"/>
+            <a:ext cx="5592000" cy="3438095"/>
+          </a:xfrm>
+          <a:prstGeom prst="rect">
+            <a:avLst/>
+          </a:prstGeom>
+        </p:spPr>
+      </p:pic>
+      <p:cxnSp>
+        <p:nvCxnSpPr>
+          <p:cNvPr id="7" name="Straight Connector 6"/>
+          <p:cNvCxnSpPr/>
+          <p:nvPr/>
+        </p:nvCxnSpPr>
+        <p:spPr>
+          <a:xfrm>
+            <a:off x="6276109" y="1690688"/>
+            <a:ext cx="13855" cy="4446876"/>
+          </a:xfrm>
+          <a:prstGeom prst="line">
+            <a:avLst/>
+          </a:prstGeom>
+          <a:ln w="53975"/>
+        </p:spPr>
+        <p:style>
+          <a:lnRef idx="1">
+            <a:schemeClr val="accent1"/>
+          </a:lnRef>
+          <a:fillRef idx="0">
+            <a:schemeClr val="accent1"/>
+          </a:fillRef>
+          <a:effectRef idx="0">
+            <a:schemeClr val="accent1"/>
+          </a:effectRef>
+          <a:fontRef idx="minor">
+            <a:schemeClr val="tx1"/>
+          </a:fontRef>
+        </p:style>
+      </p:cxnSp>
+      <p:pic>
+        <p:nvPicPr>
+          <p:cNvPr id="8" name="Picture 7"/>
+          <p:cNvPicPr>
+            <a:picLocks noChangeAspect="1"/>
+          </p:cNvPicPr>
+          <p:nvPr/>
+        </p:nvPicPr>
+        <p:blipFill>
+          <a:blip r:embed="rId3"/>
+          <a:stretch>
+            <a:fillRect/>
+          </a:stretch>
+        </p:blipFill>
+        <p:spPr>
+          <a:xfrm>
+            <a:off x="6461454" y="1800225"/>
+            <a:ext cx="5501945" cy="305654"/>
           </a:xfrm>
           <a:prstGeom prst="rect">
             <a:avLst/>
@@ -4469,25 +6102,305 @@
           <p:nvPr/>
         </p:nvPicPr>
         <p:blipFill>
-          <a:blip r:embed="rId3"/>
+          <a:blip r:embed="rId4"/>
           <a:stretch>
             <a:fillRect/>
           </a:stretch>
         </p:blipFill>
         <p:spPr>
           <a:xfrm>
-            <a:off x="233388" y="872835"/>
-            <a:ext cx="5446975" cy="4429051"/>
+            <a:off x="85725" y="1800225"/>
+            <a:ext cx="5877641" cy="4486949"/>
           </a:xfrm>
           <a:prstGeom prst="rect">
             <a:avLst/>
           </a:prstGeom>
         </p:spPr>
       </p:pic>
+      <p:sp>
+        <p:nvSpPr>
+          <p:cNvPr id="3" name="Slide Number Placeholder 2"/>
+          <p:cNvSpPr>
+            <a:spLocks noGrp="1"/>
+          </p:cNvSpPr>
+          <p:nvPr>
+            <p:ph type="sldNum" sz="quarter" idx="12"/>
+          </p:nvPr>
+        </p:nvSpPr>
+        <p:spPr/>
+        <p:txBody>
+          <a:bodyPr/>
+          <a:lstStyle/>
+          <a:p>
+            <a:fld id="{10F1DA42-9B2A-4636-961F-FFD9F81D915F}" type="slidenum">
+              <a:rPr lang="en-GB" smtClean="0"/>
+              <a:t>8</a:t>
+            </a:fld>
+            <a:endParaRPr lang="en-GB"/>
+          </a:p>
+        </p:txBody>
+      </p:sp>
     </p:spTree>
     <p:extLst>
       <p:ext uri="{BB962C8B-B14F-4D97-AF65-F5344CB8AC3E}">
-        <p14:creationId xmlns:p14="http://schemas.microsoft.com/office/powerpoint/2010/main" val="394186423"/>
+        <p14:creationId xmlns:p14="http://schemas.microsoft.com/office/powerpoint/2010/main" val="444969330"/>
+      </p:ext>
+    </p:extLst>
+  </p:cSld>
+  <p:clrMapOvr>
+    <a:masterClrMapping/>
+  </p:clrMapOvr>
+</p:sld>
+</file>
+
+<file path=ppt/slides/slide9.xml><?xml version="1.0" encoding="utf-8"?>
+<p:sld xmlns:a="http://schemas.openxmlformats.org/drawingml/2006/main" xmlns:r="http://schemas.openxmlformats.org/officeDocument/2006/relationships" xmlns:p="http://schemas.openxmlformats.org/presentationml/2006/main">
+  <p:cSld>
+    <p:spTree>
+      <p:nvGrpSpPr>
+        <p:cNvPr id="1" name=""/>
+        <p:cNvGrpSpPr/>
+        <p:nvPr/>
+      </p:nvGrpSpPr>
+      <p:grpSpPr>
+        <a:xfrm>
+          <a:off x="0" y="0"/>
+          <a:ext cx="0" cy="0"/>
+          <a:chOff x="0" y="0"/>
+          <a:chExt cx="0" cy="0"/>
+        </a:xfrm>
+      </p:grpSpPr>
+      <p:sp>
+        <p:nvSpPr>
+          <p:cNvPr id="2" name="Title 1"/>
+          <p:cNvSpPr>
+            <a:spLocks noGrp="1"/>
+          </p:cNvSpPr>
+          <p:nvPr>
+            <p:ph type="title"/>
+          </p:nvPr>
+        </p:nvSpPr>
+        <p:spPr>
+          <a:xfrm>
+            <a:off x="0" y="96982"/>
+            <a:ext cx="10515600" cy="1325563"/>
+          </a:xfrm>
+        </p:spPr>
+        <p:txBody>
+          <a:bodyPr/>
+          <a:lstStyle/>
+          <a:p>
+            <a:r>
+              <a:rPr lang="en-US" dirty="0" smtClean="0"/>
+              <a:t>7) Some great references</a:t>
+            </a:r>
+            <a:br>
+              <a:rPr lang="en-US" dirty="0" smtClean="0"/>
+            </a:br>
+            <a:r>
+              <a:rPr lang="en-US" dirty="0" smtClean="0"/>
+              <a:t>Worked Example:</a:t>
+            </a:r>
+            <a:endParaRPr lang="en-GB" dirty="0"/>
+          </a:p>
+        </p:txBody>
+      </p:sp>
+      <p:sp>
+        <p:nvSpPr>
+          <p:cNvPr id="3" name="Content Placeholder 2"/>
+          <p:cNvSpPr>
+            <a:spLocks noGrp="1"/>
+          </p:cNvSpPr>
+          <p:nvPr>
+            <p:ph idx="1"/>
+          </p:nvPr>
+        </p:nvSpPr>
+        <p:spPr>
+          <a:xfrm>
+            <a:off x="838200" y="3532909"/>
+            <a:ext cx="10515600" cy="2644054"/>
+          </a:xfrm>
+        </p:spPr>
+        <p:txBody>
+          <a:bodyPr>
+            <a:normAutofit fontScale="85000" lnSpcReduction="20000"/>
+          </a:bodyPr>
+          <a:lstStyle/>
+          <a:p>
+            <a:pPr marL="514350" indent="-514350">
+              <a:buAutoNum type="arabicParenR"/>
+            </a:pPr>
+            <a:r>
+              <a:rPr lang="en-US" u="sng" dirty="0" smtClean="0">
+                <a:hlinkClick r:id="rId2"/>
+              </a:rPr>
+              <a:t>Michael van </a:t>
+            </a:r>
+            <a:r>
+              <a:rPr lang="en-US" u="sng" dirty="0" err="1" smtClean="0">
+                <a:hlinkClick r:id="rId2"/>
+              </a:rPr>
+              <a:t>Biezen</a:t>
+            </a:r>
+            <a:r>
+              <a:rPr lang="en-US" u="sng" dirty="0" smtClean="0">
+                <a:hlinkClick r:id="rId2"/>
+              </a:rPr>
+              <a:t> – </a:t>
+            </a:r>
+            <a:r>
+              <a:rPr lang="en-US" u="sng" dirty="0" err="1" smtClean="0">
+                <a:hlinkClick r:id="rId2"/>
+              </a:rPr>
+              <a:t>youtube</a:t>
+            </a:r>
+            <a:endParaRPr lang="en-US" u="sng" dirty="0" smtClean="0">
+              <a:hlinkClick r:id="rId2"/>
+            </a:endParaRPr>
+          </a:p>
+          <a:p>
+            <a:pPr marL="0" indent="0">
+              <a:buNone/>
+            </a:pPr>
+            <a:r>
+              <a:rPr lang="en-US" dirty="0"/>
+              <a:t>Electrical Engineering: </a:t>
+            </a:r>
+            <a:r>
+              <a:rPr lang="en-US" dirty="0" err="1"/>
+              <a:t>Ch</a:t>
+            </a:r>
+            <a:r>
+              <a:rPr lang="en-US" dirty="0"/>
+              <a:t> 18: Fourier Series (1 of 35) What is a Fourier Series?</a:t>
+            </a:r>
+          </a:p>
+          <a:p>
+            <a:pPr marL="514350" indent="-514350">
+              <a:buAutoNum type="arabicParenR"/>
+            </a:pPr>
+            <a:endParaRPr lang="en-GB" u="sng" dirty="0">
+              <a:hlinkClick r:id="rId2"/>
+            </a:endParaRPr>
+          </a:p>
+          <a:p>
+            <a:pPr marL="0" indent="0">
+              <a:buNone/>
+            </a:pPr>
+            <a:r>
+              <a:rPr lang="en-GB" dirty="0" smtClean="0">
+                <a:hlinkClick r:id="rId2"/>
+              </a:rPr>
+              <a:t>https</a:t>
+            </a:r>
+            <a:r>
+              <a:rPr lang="en-GB" dirty="0">
+                <a:hlinkClick r:id="rId2"/>
+              </a:rPr>
+              <a:t>://</a:t>
+            </a:r>
+            <a:r>
+              <a:rPr lang="en-GB" dirty="0" smtClean="0">
+                <a:hlinkClick r:id="rId2"/>
+              </a:rPr>
+              <a:t>www.youtube.com/watch?v=28oKg7GMbvI&amp;list=PLX2gX-ftPVXVScC8Hz8nmcZTAMXTluTIn</a:t>
+            </a:r>
+            <a:endParaRPr lang="en-GB" dirty="0" smtClean="0"/>
+          </a:p>
+          <a:p>
+            <a:pPr marL="0" indent="0">
+              <a:buNone/>
+            </a:pPr>
+            <a:endParaRPr lang="en-GB" dirty="0" smtClean="0">
+              <a:hlinkClick r:id="rId3"/>
+            </a:endParaRPr>
+          </a:p>
+          <a:p>
+            <a:pPr marL="0" indent="0">
+              <a:buNone/>
+            </a:pPr>
+            <a:r>
+              <a:rPr lang="en-GB" dirty="0" smtClean="0">
+                <a:hlinkClick r:id="rId3"/>
+              </a:rPr>
+              <a:t>http</a:t>
+            </a:r>
+            <a:r>
+              <a:rPr lang="en-GB" dirty="0">
+                <a:hlinkClick r:id="rId3"/>
+              </a:rPr>
+              <a:t>://www.ilectureonline.com/search/fourier</a:t>
+            </a:r>
+            <a:r>
+              <a:rPr lang="en-GB" dirty="0" smtClean="0">
+                <a:hlinkClick r:id="rId3"/>
+              </a:rPr>
+              <a:t>#</a:t>
+            </a:r>
+            <a:endParaRPr lang="en-GB" dirty="0" smtClean="0"/>
+          </a:p>
+          <a:p>
+            <a:pPr marL="0" indent="0">
+              <a:buNone/>
+            </a:pPr>
+            <a:endParaRPr lang="en-GB" dirty="0" smtClean="0"/>
+          </a:p>
+          <a:p>
+            <a:endParaRPr lang="en-GB" dirty="0"/>
+          </a:p>
+        </p:txBody>
+      </p:sp>
+      <p:pic>
+        <p:nvPicPr>
+          <p:cNvPr id="4" name="Picture 3"/>
+          <p:cNvPicPr>
+            <a:picLocks noChangeAspect="1"/>
+          </p:cNvPicPr>
+          <p:nvPr/>
+        </p:nvPicPr>
+        <p:blipFill>
+          <a:blip r:embed="rId4"/>
+          <a:stretch>
+            <a:fillRect/>
+          </a:stretch>
+        </p:blipFill>
+        <p:spPr>
+          <a:xfrm>
+            <a:off x="7233280" y="96982"/>
+            <a:ext cx="4120520" cy="3732164"/>
+          </a:xfrm>
+          <a:prstGeom prst="rect">
+            <a:avLst/>
+          </a:prstGeom>
+        </p:spPr>
+      </p:pic>
+      <p:sp>
+        <p:nvSpPr>
+          <p:cNvPr id="5" name="Slide Number Placeholder 4"/>
+          <p:cNvSpPr>
+            <a:spLocks noGrp="1"/>
+          </p:cNvSpPr>
+          <p:nvPr>
+            <p:ph type="sldNum" sz="quarter" idx="12"/>
+          </p:nvPr>
+        </p:nvSpPr>
+        <p:spPr/>
+        <p:txBody>
+          <a:bodyPr/>
+          <a:lstStyle/>
+          <a:p>
+            <a:fld id="{10F1DA42-9B2A-4636-961F-FFD9F81D915F}" type="slidenum">
+              <a:rPr lang="en-GB" smtClean="0"/>
+              <a:t>9</a:t>
+            </a:fld>
+            <a:endParaRPr lang="en-GB"/>
+          </a:p>
+        </p:txBody>
+      </p:sp>
+    </p:spTree>
+    <p:extLst>
+      <p:ext uri="{BB962C8B-B14F-4D97-AF65-F5344CB8AC3E}">
+        <p14:creationId xmlns:p14="http://schemas.microsoft.com/office/powerpoint/2010/main" val="1015599197"/>
       </p:ext>
     </p:extLst>
   </p:cSld>
@@ -4756,4 +6669,265 @@
     </a:ext>
   </a:extLst>
 </a:theme>
+</file>
+
+<file path=ppt/theme/theme2.xml><?xml version="1.0" encoding="utf-8"?>
+<a:theme xmlns:a="http://schemas.openxmlformats.org/drawingml/2006/main" name="Office Theme">
+  <a:themeElements>
+    <a:clrScheme name="Office">
+      <a:dk1>
+        <a:sysClr val="windowText" lastClr="000000"/>
+      </a:dk1>
+      <a:lt1>
+        <a:sysClr val="window" lastClr="FFFFFF"/>
+      </a:lt1>
+      <a:dk2>
+        <a:srgbClr val="44546A"/>
+      </a:dk2>
+      <a:lt2>
+        <a:srgbClr val="E7E6E6"/>
+      </a:lt2>
+      <a:accent1>
+        <a:srgbClr val="5B9BD5"/>
+      </a:accent1>
+      <a:accent2>
+        <a:srgbClr val="ED7D31"/>
+      </a:accent2>
+      <a:accent3>
+        <a:srgbClr val="A5A5A5"/>
+      </a:accent3>
+      <a:accent4>
+        <a:srgbClr val="FFC000"/>
+      </a:accent4>
+      <a:accent5>
+        <a:srgbClr val="4472C4"/>
+      </a:accent5>
+      <a:accent6>
+        <a:srgbClr val="70AD47"/>
+      </a:accent6>
+      <a:hlink>
+        <a:srgbClr val="0563C1"/>
+      </a:hlink>
+      <a:folHlink>
+        <a:srgbClr val="954F72"/>
+      </a:folHlink>
+    </a:clrScheme>
+    <a:fontScheme name="Office">
+      <a:majorFont>
+        <a:latin typeface="Calibri Light" panose="020F0302020204030204"/>
+        <a:ea typeface=""/>
+        <a:cs typeface=""/>
+        <a:font script="Jpan" typeface="游ゴシック Light"/>
+        <a:font script="Hang" typeface="맑은 고딕"/>
+        <a:font script="Hans" typeface="等线 Light"/>
+        <a:font script="Hant" typeface="新細明體"/>
+        <a:font script="Arab" typeface="Times New Roman"/>
+        <a:font script="Hebr" typeface="Times New Roman"/>
+        <a:font script="Thai" typeface="Angsana New"/>
+        <a:font script="Ethi" typeface="Nyala"/>
+        <a:font script="Beng" typeface="Vrinda"/>
+        <a:font script="Gujr" typeface="Shruti"/>
+        <a:font script="Khmr" typeface="MoolBoran"/>
+        <a:font script="Knda" typeface="Tunga"/>
+        <a:font script="Guru" typeface="Raavi"/>
+        <a:font script="Cans" typeface="Euphemia"/>
+        <a:font script="Cher" typeface="Plantagenet Cherokee"/>
+        <a:font script="Yiii" typeface="Microsoft Yi Baiti"/>
+        <a:font script="Tibt" typeface="Microsoft Himalaya"/>
+        <a:font script="Thaa" typeface="MV Boli"/>
+        <a:font script="Deva" typeface="Mangal"/>
+        <a:font script="Telu" typeface="Gautami"/>
+        <a:font script="Taml" typeface="Latha"/>
+        <a:font script="Syrc" typeface="Estrangelo Edessa"/>
+        <a:font script="Orya" typeface="Kalinga"/>
+        <a:font script="Mlym" typeface="Kartika"/>
+        <a:font script="Laoo" typeface="DokChampa"/>
+        <a:font script="Sinh" typeface="Iskoola Pota"/>
+        <a:font script="Mong" typeface="Mongolian Baiti"/>
+        <a:font script="Viet" typeface="Times New Roman"/>
+        <a:font script="Uigh" typeface="Microsoft Uighur"/>
+        <a:font script="Geor" typeface="Sylfaen"/>
+      </a:majorFont>
+      <a:minorFont>
+        <a:latin typeface="Calibri" panose="020F0502020204030204"/>
+        <a:ea typeface=""/>
+        <a:cs typeface=""/>
+        <a:font script="Jpan" typeface="游ゴシック"/>
+        <a:font script="Hang" typeface="맑은 고딕"/>
+        <a:font script="Hans" typeface="等线"/>
+        <a:font script="Hant" typeface="新細明體"/>
+        <a:font script="Arab" typeface="Arial"/>
+        <a:font script="Hebr" typeface="Arial"/>
+        <a:font script="Thai" typeface="Cordia New"/>
+        <a:font script="Ethi" typeface="Nyala"/>
+        <a:font script="Beng" typeface="Vrinda"/>
+        <a:font script="Gujr" typeface="Shruti"/>
+        <a:font script="Khmr" typeface="DaunPenh"/>
+        <a:font script="Knda" typeface="Tunga"/>
+        <a:font script="Guru" typeface="Raavi"/>
+        <a:font script="Cans" typeface="Euphemia"/>
+        <a:font script="Cher" typeface="Plantagenet Cherokee"/>
+        <a:font script="Yiii" typeface="Microsoft Yi Baiti"/>
+        <a:font script="Tibt" typeface="Microsoft Himalaya"/>
+        <a:font script="Thaa" typeface="MV Boli"/>
+        <a:font script="Deva" typeface="Mangal"/>
+        <a:font script="Telu" typeface="Gautami"/>
+        <a:font script="Taml" typeface="Latha"/>
+        <a:font script="Syrc" typeface="Estrangelo Edessa"/>
+        <a:font script="Orya" typeface="Kalinga"/>
+        <a:font script="Mlym" typeface="Kartika"/>
+        <a:font script="Laoo" typeface="DokChampa"/>
+        <a:font script="Sinh" typeface="Iskoola Pota"/>
+        <a:font script="Mong" typeface="Mongolian Baiti"/>
+        <a:font script="Viet" typeface="Arial"/>
+        <a:font script="Uigh" typeface="Microsoft Uighur"/>
+        <a:font script="Geor" typeface="Sylfaen"/>
+      </a:minorFont>
+    </a:fontScheme>
+    <a:fmtScheme name="Office">
+      <a:fillStyleLst>
+        <a:solidFill>
+          <a:schemeClr val="phClr"/>
+        </a:solidFill>
+        <a:gradFill rotWithShape="1">
+          <a:gsLst>
+            <a:gs pos="0">
+              <a:schemeClr val="phClr">
+                <a:lumMod val="110000"/>
+                <a:satMod val="105000"/>
+                <a:tint val="67000"/>
+              </a:schemeClr>
+            </a:gs>
+            <a:gs pos="50000">
+              <a:schemeClr val="phClr">
+                <a:lumMod val="105000"/>
+                <a:satMod val="103000"/>
+                <a:tint val="73000"/>
+              </a:schemeClr>
+            </a:gs>
+            <a:gs pos="100000">
+              <a:schemeClr val="phClr">
+                <a:lumMod val="105000"/>
+                <a:satMod val="109000"/>
+                <a:tint val="81000"/>
+              </a:schemeClr>
+            </a:gs>
+          </a:gsLst>
+          <a:lin ang="5400000" scaled="0"/>
+        </a:gradFill>
+        <a:gradFill rotWithShape="1">
+          <a:gsLst>
+            <a:gs pos="0">
+              <a:schemeClr val="phClr">
+                <a:satMod val="103000"/>
+                <a:lumMod val="102000"/>
+                <a:tint val="94000"/>
+              </a:schemeClr>
+            </a:gs>
+            <a:gs pos="50000">
+              <a:schemeClr val="phClr">
+                <a:satMod val="110000"/>
+                <a:lumMod val="100000"/>
+                <a:shade val="100000"/>
+              </a:schemeClr>
+            </a:gs>
+            <a:gs pos="100000">
+              <a:schemeClr val="phClr">
+                <a:lumMod val="99000"/>
+                <a:satMod val="120000"/>
+                <a:shade val="78000"/>
+              </a:schemeClr>
+            </a:gs>
+          </a:gsLst>
+          <a:lin ang="5400000" scaled="0"/>
+        </a:gradFill>
+      </a:fillStyleLst>
+      <a:lnStyleLst>
+        <a:ln w="6350" cap="flat" cmpd="sng" algn="ctr">
+          <a:solidFill>
+            <a:schemeClr val="phClr"/>
+          </a:solidFill>
+          <a:prstDash val="solid"/>
+          <a:miter lim="800000"/>
+        </a:ln>
+        <a:ln w="12700" cap="flat" cmpd="sng" algn="ctr">
+          <a:solidFill>
+            <a:schemeClr val="phClr"/>
+          </a:solidFill>
+          <a:prstDash val="solid"/>
+          <a:miter lim="800000"/>
+        </a:ln>
+        <a:ln w="19050" cap="flat" cmpd="sng" algn="ctr">
+          <a:solidFill>
+            <a:schemeClr val="phClr"/>
+          </a:solidFill>
+          <a:prstDash val="solid"/>
+          <a:miter lim="800000"/>
+        </a:ln>
+      </a:lnStyleLst>
+      <a:effectStyleLst>
+        <a:effectStyle>
+          <a:effectLst/>
+        </a:effectStyle>
+        <a:effectStyle>
+          <a:effectLst/>
+        </a:effectStyle>
+        <a:effectStyle>
+          <a:effectLst>
+            <a:outerShdw blurRad="57150" dist="19050" dir="5400000" algn="ctr" rotWithShape="0">
+              <a:srgbClr val="000000">
+                <a:alpha val="63000"/>
+              </a:srgbClr>
+            </a:outerShdw>
+          </a:effectLst>
+        </a:effectStyle>
+      </a:effectStyleLst>
+      <a:bgFillStyleLst>
+        <a:solidFill>
+          <a:schemeClr val="phClr"/>
+        </a:solidFill>
+        <a:solidFill>
+          <a:schemeClr val="phClr">
+            <a:tint val="95000"/>
+            <a:satMod val="170000"/>
+          </a:schemeClr>
+        </a:solidFill>
+        <a:gradFill rotWithShape="1">
+          <a:gsLst>
+            <a:gs pos="0">
+              <a:schemeClr val="phClr">
+                <a:tint val="93000"/>
+                <a:satMod val="150000"/>
+                <a:shade val="98000"/>
+                <a:lumMod val="102000"/>
+              </a:schemeClr>
+            </a:gs>
+            <a:gs pos="50000">
+              <a:schemeClr val="phClr">
+                <a:tint val="98000"/>
+                <a:satMod val="130000"/>
+                <a:shade val="90000"/>
+                <a:lumMod val="103000"/>
+              </a:schemeClr>
+            </a:gs>
+            <a:gs pos="100000">
+              <a:schemeClr val="phClr">
+                <a:shade val="63000"/>
+                <a:satMod val="120000"/>
+              </a:schemeClr>
+            </a:gs>
+          </a:gsLst>
+          <a:lin ang="5400000" scaled="0"/>
+        </a:gradFill>
+      </a:bgFillStyleLst>
+    </a:fmtScheme>
+  </a:themeElements>
+  <a:objectDefaults/>
+  <a:extraClrSchemeLst/>
+  <a:extLst>
+    <a:ext uri="{05A4C25C-085E-4340-85A3-A5531E510DB2}">
+      <thm15:themeFamily xmlns:thm15="http://schemas.microsoft.com/office/thememl/2012/main" name="Office Theme" id="{62F939B6-93AF-4DB8-9C6B-D6C7DFDC589F}" vid="{4A3C46E8-61CC-4603-A589-7422A47A8E4A}"/>
+    </a:ext>
+  </a:extLst>
+</a:theme>
 </file>
</xml_diff>